<commit_message>
Update Week 10 Lecture 1 - Initial conditions.pptx
</commit_message>
<xml_diff>
--- a/PP WORK/Instructor Version/Week 10/Week 10 Lecture 1 - Initial conditions.pptx
+++ b/PP WORK/Instructor Version/Week 10/Week 10 Lecture 1 - Initial conditions.pptx
@@ -144,7 +144,7 @@
   </p:defaultTextStyle>
   <p:extLst>
     <p:ext uri="{EFAFB233-063F-42B5-8137-9DF3F51BA10A}">
-      <p15:sldGuideLst xmlns:p15="http://schemas.microsoft.com/office/powerpoint/2012/main" xmlns=""/>
+      <p15:sldGuideLst xmlns="" xmlns:p15="http://schemas.microsoft.com/office/powerpoint/2012/main"/>
     </p:ext>
   </p:extLst>
 </p:presentation>
@@ -2905,7 +2905,7 @@
           <p:cNvPr id="2" name="Title 1">
             <a:extLst>
               <a:ext uri="{FF2B5EF4-FFF2-40B4-BE49-F238E27FC236}">
-                <a16:creationId xmlns:a16="http://schemas.microsoft.com/office/drawing/2014/main" xmlns="" id="{8267C4E5-55F7-DB05-186B-06791E1D1784}"/>
+                <a16:creationId xmlns="" xmlns:a16="http://schemas.microsoft.com/office/drawing/2014/main" id="{8267C4E5-55F7-DB05-186B-06791E1D1784}"/>
               </a:ext>
             </a:extLst>
           </p:cNvPr>
@@ -2934,7 +2934,7 @@
           <p:cNvPr id="3" name="Footer Placeholder 2">
             <a:extLst>
               <a:ext uri="{FF2B5EF4-FFF2-40B4-BE49-F238E27FC236}">
-                <a16:creationId xmlns:a16="http://schemas.microsoft.com/office/drawing/2014/main" xmlns="" id="{B3AA35ED-DF99-6958-28FA-33A93BB97722}"/>
+                <a16:creationId xmlns="" xmlns:a16="http://schemas.microsoft.com/office/drawing/2014/main" id="{B3AA35ED-DF99-6958-28FA-33A93BB97722}"/>
               </a:ext>
             </a:extLst>
           </p:cNvPr>
@@ -2959,7 +2959,7 @@
           <p:cNvPr id="4" name="Date Placeholder 3">
             <a:extLst>
               <a:ext uri="{FF2B5EF4-FFF2-40B4-BE49-F238E27FC236}">
-                <a16:creationId xmlns:a16="http://schemas.microsoft.com/office/drawing/2014/main" xmlns="" id="{55503DB0-5264-6061-D4B6-AE3D944FC839}"/>
+                <a16:creationId xmlns="" xmlns:a16="http://schemas.microsoft.com/office/drawing/2014/main" id="{55503DB0-5264-6061-D4B6-AE3D944FC839}"/>
               </a:ext>
             </a:extLst>
           </p:cNvPr>
@@ -2988,7 +2988,7 @@
           <p:cNvPr id="5" name="Slide Number Placeholder 4">
             <a:extLst>
               <a:ext uri="{FF2B5EF4-FFF2-40B4-BE49-F238E27FC236}">
-                <a16:creationId xmlns:a16="http://schemas.microsoft.com/office/drawing/2014/main" xmlns="" id="{306C615E-9D94-7E15-4EC3-69D6111D00EE}"/>
+                <a16:creationId xmlns="" xmlns:a16="http://schemas.microsoft.com/office/drawing/2014/main" id="{306C615E-9D94-7E15-4EC3-69D6111D00EE}"/>
               </a:ext>
             </a:extLst>
           </p:cNvPr>
@@ -3171,7 +3171,7 @@
           <p:cNvPr id="8" name="Google Shape;54;p1">
             <a:extLst>
               <a:ext uri="{FF2B5EF4-FFF2-40B4-BE49-F238E27FC236}">
-                <a16:creationId xmlns:a16="http://schemas.microsoft.com/office/drawing/2014/main" xmlns="" id="{631C2DF5-1362-47E0-9992-CA0F5EE5E7F4}"/>
+                <a16:creationId xmlns="" xmlns:a16="http://schemas.microsoft.com/office/drawing/2014/main" id="{631C2DF5-1362-47E0-9992-CA0F5EE5E7F4}"/>
               </a:ext>
             </a:extLst>
           </p:cNvPr>
@@ -3258,7 +3258,7 @@
           <p:cNvPr id="9" name="Google Shape;55;p1">
             <a:extLst>
               <a:ext uri="{FF2B5EF4-FFF2-40B4-BE49-F238E27FC236}">
-                <a16:creationId xmlns:a16="http://schemas.microsoft.com/office/drawing/2014/main" xmlns="" id="{E5E4EFC6-10AC-457A-90BE-EB16C5D5FDC1}"/>
+                <a16:creationId xmlns="" xmlns:a16="http://schemas.microsoft.com/office/drawing/2014/main" id="{E5E4EFC6-10AC-457A-90BE-EB16C5D5FDC1}"/>
               </a:ext>
             </a:extLst>
           </p:cNvPr>
@@ -3330,7 +3330,7 @@
           <p:cNvPr id="10" name="Oval 9">
             <a:extLst>
               <a:ext uri="{FF2B5EF4-FFF2-40B4-BE49-F238E27FC236}">
-                <a16:creationId xmlns:a16="http://schemas.microsoft.com/office/drawing/2014/main" xmlns="" id="{38DC77A7-8710-436F-B5E7-19B60E66B5F0}"/>
+                <a16:creationId xmlns="" xmlns:a16="http://schemas.microsoft.com/office/drawing/2014/main" id="{38DC77A7-8710-436F-B5E7-19B60E66B5F0}"/>
               </a:ext>
             </a:extLst>
           </p:cNvPr>
@@ -3382,7 +3382,7 @@
           <p:cNvPr id="11" name="Picture 10" descr="A red and white background with a design&#10;&#10;Description automatically generated">
             <a:extLst>
               <a:ext uri="{FF2B5EF4-FFF2-40B4-BE49-F238E27FC236}">
-                <a16:creationId xmlns:a16="http://schemas.microsoft.com/office/drawing/2014/main" xmlns="" id="{418E62F8-02A7-4379-A005-0EF5EC635BBF}"/>
+                <a16:creationId xmlns="" xmlns:a16="http://schemas.microsoft.com/office/drawing/2014/main" id="{418E62F8-02A7-4379-A005-0EF5EC635BBF}"/>
               </a:ext>
             </a:extLst>
           </p:cNvPr>
@@ -3412,7 +3412,7 @@
           <p:cNvPr id="12" name="Picture 11">
             <a:extLst>
               <a:ext uri="{FF2B5EF4-FFF2-40B4-BE49-F238E27FC236}">
-                <a16:creationId xmlns:a16="http://schemas.microsoft.com/office/drawing/2014/main" xmlns="" id="{28A0ADE9-7A46-486B-82F3-A690D904DFF4}"/>
+                <a16:creationId xmlns="" xmlns:a16="http://schemas.microsoft.com/office/drawing/2014/main" id="{28A0ADE9-7A46-486B-82F3-A690D904DFF4}"/>
               </a:ext>
             </a:extLst>
           </p:cNvPr>
@@ -3472,7 +3472,7 @@
           <p:cNvPr id="25" name="Rectangle 24">
             <a:extLst>
               <a:ext uri="{FF2B5EF4-FFF2-40B4-BE49-F238E27FC236}">
-                <a16:creationId xmlns:a16="http://schemas.microsoft.com/office/drawing/2014/main" xmlns="" id="{669E0535-6FD9-4D8F-80CA-FF7A96DB665F}"/>
+                <a16:creationId xmlns="" xmlns:a16="http://schemas.microsoft.com/office/drawing/2014/main" id="{669E0535-6FD9-4D8F-80CA-FF7A96DB665F}"/>
               </a:ext>
             </a:extLst>
           </p:cNvPr>
@@ -3524,7 +3524,7 @@
           <p:cNvPr id="26" name="Picture 25" descr="A black and red background with a bird&#10;&#10;Description automatically generated">
             <a:extLst>
               <a:ext uri="{FF2B5EF4-FFF2-40B4-BE49-F238E27FC236}">
-                <a16:creationId xmlns:a16="http://schemas.microsoft.com/office/drawing/2014/main" xmlns="" id="{7356EFA9-D406-4147-B1F7-82B217840839}"/>
+                <a16:creationId xmlns="" xmlns:a16="http://schemas.microsoft.com/office/drawing/2014/main" id="{7356EFA9-D406-4147-B1F7-82B217840839}"/>
               </a:ext>
             </a:extLst>
           </p:cNvPr>
@@ -3554,7 +3554,7 @@
           <p:cNvPr id="27" name="Google Shape;15;p13">
             <a:extLst>
               <a:ext uri="{FF2B5EF4-FFF2-40B4-BE49-F238E27FC236}">
-                <a16:creationId xmlns:a16="http://schemas.microsoft.com/office/drawing/2014/main" xmlns="" id="{F5F3B15A-58C1-48A3-AB6A-E8A3A8F0B1F0}"/>
+                <a16:creationId xmlns="" xmlns:a16="http://schemas.microsoft.com/office/drawing/2014/main" id="{F5F3B15A-58C1-48A3-AB6A-E8A3A8F0B1F0}"/>
               </a:ext>
             </a:extLst>
           </p:cNvPr>
@@ -3720,7 +3720,7 @@
           <p:cNvPr id="28" name="Google Shape;19;p14">
             <a:extLst>
               <a:ext uri="{FF2B5EF4-FFF2-40B4-BE49-F238E27FC236}">
-                <a16:creationId xmlns:a16="http://schemas.microsoft.com/office/drawing/2014/main" xmlns="" id="{A6353D6C-199F-4C21-9FC8-2D00FAAA26A6}"/>
+                <a16:creationId xmlns="" xmlns:a16="http://schemas.microsoft.com/office/drawing/2014/main" id="{A6353D6C-199F-4C21-9FC8-2D00FAAA26A6}"/>
               </a:ext>
             </a:extLst>
           </p:cNvPr>
@@ -3999,7 +3999,7 @@
           <p:cNvPr id="29" name="Google Shape;55;p1">
             <a:extLst>
               <a:ext uri="{FF2B5EF4-FFF2-40B4-BE49-F238E27FC236}">
-                <a16:creationId xmlns:a16="http://schemas.microsoft.com/office/drawing/2014/main" xmlns="" id="{4544F053-DAFF-4191-A4FE-EAC318BF6A0C}"/>
+                <a16:creationId xmlns="" xmlns:a16="http://schemas.microsoft.com/office/drawing/2014/main" id="{4544F053-DAFF-4191-A4FE-EAC318BF6A0C}"/>
               </a:ext>
             </a:extLst>
           </p:cNvPr>
@@ -4071,7 +4071,7 @@
           <p:cNvPr id="2" name="Title 1">
             <a:extLst>
               <a:ext uri="{FF2B5EF4-FFF2-40B4-BE49-F238E27FC236}">
-                <a16:creationId xmlns:a16="http://schemas.microsoft.com/office/drawing/2014/main" xmlns="" id="{7B6E2517-3805-41A0-9280-523D3C8CC82F}"/>
+                <a16:creationId xmlns="" xmlns:a16="http://schemas.microsoft.com/office/drawing/2014/main" id="{7B6E2517-3805-41A0-9280-523D3C8CC82F}"/>
               </a:ext>
             </a:extLst>
           </p:cNvPr>
@@ -4727,7 +4727,7 @@
           <p:cNvPr id="2" name="TextBox 1">
             <a:extLst>
               <a:ext uri="{FF2B5EF4-FFF2-40B4-BE49-F238E27FC236}">
-                <a16:creationId xmlns:a16="http://schemas.microsoft.com/office/drawing/2014/main" xmlns="" id="{07DEEC26-75A9-F4A2-6948-691F17B753B2}"/>
+                <a16:creationId xmlns="" xmlns:a16="http://schemas.microsoft.com/office/drawing/2014/main" id="{07DEEC26-75A9-F4A2-6948-691F17B753B2}"/>
               </a:ext>
             </a:extLst>
           </p:cNvPr>
@@ -4935,7 +4935,7 @@
           <p:cNvPr id="9" name="Rectangle 8">
             <a:extLst>
               <a:ext uri="{FF2B5EF4-FFF2-40B4-BE49-F238E27FC236}">
-                <a16:creationId xmlns:a16="http://schemas.microsoft.com/office/drawing/2014/main" xmlns="" id="{76C0C0D8-B009-40BC-BC9A-2AA8B4B99AAD}"/>
+                <a16:creationId xmlns="" xmlns:a16="http://schemas.microsoft.com/office/drawing/2014/main" id="{76C0C0D8-B009-40BC-BC9A-2AA8B4B99AAD}"/>
               </a:ext>
             </a:extLst>
           </p:cNvPr>
@@ -5038,7 +5038,7 @@
           <p:cNvPr id="10" name="Oval 9">
             <a:extLst>
               <a:ext uri="{FF2B5EF4-FFF2-40B4-BE49-F238E27FC236}">
-                <a16:creationId xmlns:a16="http://schemas.microsoft.com/office/drawing/2014/main" xmlns="" id="{5A5561A3-9BBD-4E82-8421-B4D8AF200E31}"/>
+                <a16:creationId xmlns="" xmlns:a16="http://schemas.microsoft.com/office/drawing/2014/main" id="{5A5561A3-9BBD-4E82-8421-B4D8AF200E31}"/>
               </a:ext>
             </a:extLst>
           </p:cNvPr>
@@ -5085,7 +5085,7 @@
           <p:cNvPr id="11" name="Straight Arrow Connector 10">
             <a:extLst>
               <a:ext uri="{FF2B5EF4-FFF2-40B4-BE49-F238E27FC236}">
-                <a16:creationId xmlns:a16="http://schemas.microsoft.com/office/drawing/2014/main" xmlns="" id="{EAFA5545-53BA-47EB-82DD-9A41D8DD2A9D}"/>
+                <a16:creationId xmlns="" xmlns:a16="http://schemas.microsoft.com/office/drawing/2014/main" id="{EAFA5545-53BA-47EB-82DD-9A41D8DD2A9D}"/>
               </a:ext>
             </a:extLst>
           </p:cNvPr>
@@ -5126,7 +5126,7 @@
           <p:cNvPr id="12" name="TextBox 11">
             <a:extLst>
               <a:ext uri="{FF2B5EF4-FFF2-40B4-BE49-F238E27FC236}">
-                <a16:creationId xmlns:a16="http://schemas.microsoft.com/office/drawing/2014/main" xmlns="" id="{856668F3-E2B5-40D5-A889-6DA4E37AA000}"/>
+                <a16:creationId xmlns="" xmlns:a16="http://schemas.microsoft.com/office/drawing/2014/main" id="{856668F3-E2B5-40D5-A889-6DA4E37AA000}"/>
               </a:ext>
             </a:extLst>
           </p:cNvPr>
@@ -5161,7 +5161,7 @@
           <p:cNvPr id="5" name="TextBox 4">
             <a:extLst>
               <a:ext uri="{FF2B5EF4-FFF2-40B4-BE49-F238E27FC236}">
-                <a16:creationId xmlns:a16="http://schemas.microsoft.com/office/drawing/2014/main" xmlns="" id="{CEA19C9C-BC41-487C-A4AB-DD8C8F89AC0B}"/>
+                <a16:creationId xmlns="" xmlns:a16="http://schemas.microsoft.com/office/drawing/2014/main" id="{CEA19C9C-BC41-487C-A4AB-DD8C8F89AC0B}"/>
               </a:ext>
             </a:extLst>
           </p:cNvPr>
@@ -5198,7 +5198,7 @@
               <p:cNvPr id="16" name="TextBox 15">
                 <a:extLst>
                   <a:ext uri="{FF2B5EF4-FFF2-40B4-BE49-F238E27FC236}">
-                    <a16:creationId xmlns:a16="http://schemas.microsoft.com/office/drawing/2014/main" xmlns="" id="{C72AD0D2-5F0D-F714-138D-884034D96257}"/>
+                    <a16:creationId xmlns="" xmlns:a16="http://schemas.microsoft.com/office/drawing/2014/main" id="{C72AD0D2-5F0D-F714-138D-884034D96257}"/>
                   </a:ext>
                 </a:extLst>
               </p:cNvPr>
@@ -5455,7 +5455,7 @@
               <p:cNvPr id="17" name="TextBox 16">
                 <a:extLst>
                   <a:ext uri="{FF2B5EF4-FFF2-40B4-BE49-F238E27FC236}">
-                    <a16:creationId xmlns:a16="http://schemas.microsoft.com/office/drawing/2014/main" xmlns="" id="{D1781C96-40D1-BB1A-8488-6BA6E8744D8B}"/>
+                    <a16:creationId xmlns="" xmlns:a16="http://schemas.microsoft.com/office/drawing/2014/main" id="{D1781C96-40D1-BB1A-8488-6BA6E8744D8B}"/>
                   </a:ext>
                 </a:extLst>
               </p:cNvPr>
@@ -5761,7 +5761,7 @@
           <p:cNvPr id="4" name="Rectangle 3">
             <a:extLst>
               <a:ext uri="{FF2B5EF4-FFF2-40B4-BE49-F238E27FC236}">
-                <a16:creationId xmlns:a16="http://schemas.microsoft.com/office/drawing/2014/main" xmlns="" id="{10FBE1CC-1C19-4847-8681-C507B285FE00}"/>
+                <a16:creationId xmlns="" xmlns:a16="http://schemas.microsoft.com/office/drawing/2014/main" id="{10FBE1CC-1C19-4847-8681-C507B285FE00}"/>
               </a:ext>
             </a:extLst>
           </p:cNvPr>
@@ -5807,7 +5807,7 @@
           <p:cNvPr id="5" name="Rectangle 1">
             <a:extLst>
               <a:ext uri="{FF2B5EF4-FFF2-40B4-BE49-F238E27FC236}">
-                <a16:creationId xmlns:a16="http://schemas.microsoft.com/office/drawing/2014/main" xmlns="" id="{9D897AB3-9624-5C46-8440-16FF98783E86}"/>
+                <a16:creationId xmlns="" xmlns:a16="http://schemas.microsoft.com/office/drawing/2014/main" id="{9D897AB3-9624-5C46-8440-16FF98783E86}"/>
               </a:ext>
             </a:extLst>
           </p:cNvPr>
@@ -6045,7 +6045,7 @@
           <p:cNvPr id="9" name="Picture 8">
             <a:extLst>
               <a:ext uri="{FF2B5EF4-FFF2-40B4-BE49-F238E27FC236}">
-                <a16:creationId xmlns:a16="http://schemas.microsoft.com/office/drawing/2014/main" xmlns="" id="{78E9F55D-B1D3-5F46-9E93-1DDD0E6C1873}"/>
+                <a16:creationId xmlns="" xmlns:a16="http://schemas.microsoft.com/office/drawing/2014/main" id="{78E9F55D-B1D3-5F46-9E93-1DDD0E6C1873}"/>
               </a:ext>
             </a:extLst>
           </p:cNvPr>
@@ -6079,7 +6079,7 @@
           <p:cNvPr id="13" name="TextBox 12">
             <a:extLst>
               <a:ext uri="{FF2B5EF4-FFF2-40B4-BE49-F238E27FC236}">
-                <a16:creationId xmlns:a16="http://schemas.microsoft.com/office/drawing/2014/main" xmlns="" id="{91073E7A-82D0-4541-A92E-F369C19473E9}"/>
+                <a16:creationId xmlns="" xmlns:a16="http://schemas.microsoft.com/office/drawing/2014/main" id="{91073E7A-82D0-4541-A92E-F369C19473E9}"/>
               </a:ext>
             </a:extLst>
           </p:cNvPr>
@@ -6148,7 +6148,7 @@
           <p:cNvPr id="4" name="Rectangle 3">
             <a:extLst>
               <a:ext uri="{FF2B5EF4-FFF2-40B4-BE49-F238E27FC236}">
-                <a16:creationId xmlns:a16="http://schemas.microsoft.com/office/drawing/2014/main" xmlns="" id="{10FBE1CC-1C19-4847-8681-C507B285FE00}"/>
+                <a16:creationId xmlns="" xmlns:a16="http://schemas.microsoft.com/office/drawing/2014/main" id="{10FBE1CC-1C19-4847-8681-C507B285FE00}"/>
               </a:ext>
             </a:extLst>
           </p:cNvPr>
@@ -6194,7 +6194,7 @@
           <p:cNvPr id="7" name="Rectangle 1">
             <a:extLst>
               <a:ext uri="{FF2B5EF4-FFF2-40B4-BE49-F238E27FC236}">
-                <a16:creationId xmlns:a16="http://schemas.microsoft.com/office/drawing/2014/main" xmlns="" id="{A357AF2B-930B-D146-A5E8-BD5AD52532BB}"/>
+                <a16:creationId xmlns="" xmlns:a16="http://schemas.microsoft.com/office/drawing/2014/main" id="{A357AF2B-930B-D146-A5E8-BD5AD52532BB}"/>
               </a:ext>
             </a:extLst>
           </p:cNvPr>
@@ -6456,7 +6456,7 @@
           <p:cNvPr id="12" name="Picture 11">
             <a:extLst>
               <a:ext uri="{FF2B5EF4-FFF2-40B4-BE49-F238E27FC236}">
-                <a16:creationId xmlns:a16="http://schemas.microsoft.com/office/drawing/2014/main" xmlns="" id="{39EC7418-7330-1141-A1D4-667E76F5469F}"/>
+                <a16:creationId xmlns="" xmlns:a16="http://schemas.microsoft.com/office/drawing/2014/main" id="{39EC7418-7330-1141-A1D4-667E76F5469F}"/>
               </a:ext>
             </a:extLst>
           </p:cNvPr>
@@ -6488,7 +6488,7 @@
           <p:cNvPr id="14" name="TextBox 13">
             <a:extLst>
               <a:ext uri="{FF2B5EF4-FFF2-40B4-BE49-F238E27FC236}">
-                <a16:creationId xmlns:a16="http://schemas.microsoft.com/office/drawing/2014/main" xmlns="" id="{1957CABD-1C6B-0A41-8A97-131EACFE7A8B}"/>
+                <a16:creationId xmlns="" xmlns:a16="http://schemas.microsoft.com/office/drawing/2014/main" id="{1957CABD-1C6B-0A41-8A97-131EACFE7A8B}"/>
               </a:ext>
             </a:extLst>
           </p:cNvPr>
@@ -6530,7 +6530,7 @@
           <p:cNvPr id="10" name="Rectangle 9">
             <a:extLst>
               <a:ext uri="{FF2B5EF4-FFF2-40B4-BE49-F238E27FC236}">
-                <a16:creationId xmlns:a16="http://schemas.microsoft.com/office/drawing/2014/main" xmlns="" id="{0A06E99A-C673-41B0-9EC3-CB2B85F0002F}"/>
+                <a16:creationId xmlns="" xmlns:a16="http://schemas.microsoft.com/office/drawing/2014/main" id="{0A06E99A-C673-41B0-9EC3-CB2B85F0002F}"/>
               </a:ext>
             </a:extLst>
           </p:cNvPr>
@@ -6745,7 +6745,7 @@
           <p:cNvPr id="11" name="Picture 10">
             <a:extLst>
               <a:ext uri="{FF2B5EF4-FFF2-40B4-BE49-F238E27FC236}">
-                <a16:creationId xmlns:a16="http://schemas.microsoft.com/office/drawing/2014/main" xmlns="" id="{7683CDF0-541A-45CF-B36E-B583386D55CE}"/>
+                <a16:creationId xmlns="" xmlns:a16="http://schemas.microsoft.com/office/drawing/2014/main" id="{7683CDF0-541A-45CF-B36E-B583386D55CE}"/>
               </a:ext>
             </a:extLst>
           </p:cNvPr>
@@ -6779,7 +6779,7 @@
           <p:cNvPr id="15" name="TextBox 14">
             <a:extLst>
               <a:ext uri="{FF2B5EF4-FFF2-40B4-BE49-F238E27FC236}">
-                <a16:creationId xmlns:a16="http://schemas.microsoft.com/office/drawing/2014/main" xmlns="" id="{F731F5D8-5BD9-430E-841B-1536BA6E95B5}"/>
+                <a16:creationId xmlns="" xmlns:a16="http://schemas.microsoft.com/office/drawing/2014/main" id="{F731F5D8-5BD9-430E-841B-1536BA6E95B5}"/>
               </a:ext>
             </a:extLst>
           </p:cNvPr>
@@ -6848,7 +6848,7 @@
           <p:cNvPr id="7" name="Picture 6">
             <a:extLst>
               <a:ext uri="{FF2B5EF4-FFF2-40B4-BE49-F238E27FC236}">
-                <a16:creationId xmlns:a16="http://schemas.microsoft.com/office/drawing/2014/main" xmlns="" id="{922B2724-437B-C748-A367-72C3D4D425DC}"/>
+                <a16:creationId xmlns="" xmlns:a16="http://schemas.microsoft.com/office/drawing/2014/main" id="{922B2724-437B-C748-A367-72C3D4D425DC}"/>
               </a:ext>
             </a:extLst>
           </p:cNvPr>
@@ -6884,7 +6884,7 @@
           <p:cNvPr id="8" name="Picture 7">
             <a:extLst>
               <a:ext uri="{FF2B5EF4-FFF2-40B4-BE49-F238E27FC236}">
-                <a16:creationId xmlns:a16="http://schemas.microsoft.com/office/drawing/2014/main" xmlns="" id="{F73BE934-1822-9447-A78A-6FAB42A9F0AB}"/>
+                <a16:creationId xmlns="" xmlns:a16="http://schemas.microsoft.com/office/drawing/2014/main" id="{F73BE934-1822-9447-A78A-6FAB42A9F0AB}"/>
               </a:ext>
             </a:extLst>
           </p:cNvPr>
@@ -6920,7 +6920,7 @@
           <p:cNvPr id="10" name="Rectangle 2">
             <a:extLst>
               <a:ext uri="{FF2B5EF4-FFF2-40B4-BE49-F238E27FC236}">
-                <a16:creationId xmlns:a16="http://schemas.microsoft.com/office/drawing/2014/main" xmlns="" id="{7383D938-8423-8842-B5D3-99A05C05A02A}"/>
+                <a16:creationId xmlns="" xmlns:a16="http://schemas.microsoft.com/office/drawing/2014/main" id="{7383D938-8423-8842-B5D3-99A05C05A02A}"/>
               </a:ext>
             </a:extLst>
           </p:cNvPr>
@@ -7044,7 +7044,7 @@
           <p:cNvPr id="11" name="Picture 10">
             <a:extLst>
               <a:ext uri="{FF2B5EF4-FFF2-40B4-BE49-F238E27FC236}">
-                <a16:creationId xmlns:a16="http://schemas.microsoft.com/office/drawing/2014/main" xmlns="" id="{C3ADAF45-6EB7-412C-8D5C-E3974564CE7A}"/>
+                <a16:creationId xmlns="" xmlns:a16="http://schemas.microsoft.com/office/drawing/2014/main" id="{C3ADAF45-6EB7-412C-8D5C-E3974564CE7A}"/>
               </a:ext>
             </a:extLst>
           </p:cNvPr>
@@ -7080,7 +7080,7 @@
           <p:cNvPr id="12" name="Straight Arrow Connector 11">
             <a:extLst>
               <a:ext uri="{FF2B5EF4-FFF2-40B4-BE49-F238E27FC236}">
-                <a16:creationId xmlns:a16="http://schemas.microsoft.com/office/drawing/2014/main" xmlns="" id="{7D4342B5-22BB-4522-BA12-C086D74A696E}"/>
+                <a16:creationId xmlns="" xmlns:a16="http://schemas.microsoft.com/office/drawing/2014/main" id="{7D4342B5-22BB-4522-BA12-C086D74A696E}"/>
               </a:ext>
             </a:extLst>
           </p:cNvPr>
@@ -7124,7 +7124,7 @@
           <p:cNvPr id="13" name="Straight Arrow Connector 12">
             <a:extLst>
               <a:ext uri="{FF2B5EF4-FFF2-40B4-BE49-F238E27FC236}">
-                <a16:creationId xmlns:a16="http://schemas.microsoft.com/office/drawing/2014/main" xmlns="" id="{4E7E0131-B25B-40B1-93EE-96D10C9E054A}"/>
+                <a16:creationId xmlns="" xmlns:a16="http://schemas.microsoft.com/office/drawing/2014/main" id="{4E7E0131-B25B-40B1-93EE-96D10C9E054A}"/>
               </a:ext>
             </a:extLst>
           </p:cNvPr>
@@ -7168,7 +7168,7 @@
           <p:cNvPr id="14" name="TextBox 13">
             <a:extLst>
               <a:ext uri="{FF2B5EF4-FFF2-40B4-BE49-F238E27FC236}">
-                <a16:creationId xmlns:a16="http://schemas.microsoft.com/office/drawing/2014/main" xmlns="" id="{8B028D0A-7E06-4C18-812C-F9515C3EF4CC}"/>
+                <a16:creationId xmlns="" xmlns:a16="http://schemas.microsoft.com/office/drawing/2014/main" id="{8B028D0A-7E06-4C18-812C-F9515C3EF4CC}"/>
               </a:ext>
             </a:extLst>
           </p:cNvPr>
@@ -7237,7 +7237,7 @@
           <p:cNvPr id="4" name="Rectangle 2">
             <a:extLst>
               <a:ext uri="{FF2B5EF4-FFF2-40B4-BE49-F238E27FC236}">
-                <a16:creationId xmlns:a16="http://schemas.microsoft.com/office/drawing/2014/main" xmlns="" id="{D280FF8F-620C-3849-BD59-0E5C0DA441BE}"/>
+                <a16:creationId xmlns="" xmlns:a16="http://schemas.microsoft.com/office/drawing/2014/main" id="{D280FF8F-620C-3849-BD59-0E5C0DA441BE}"/>
               </a:ext>
             </a:extLst>
           </p:cNvPr>
@@ -7306,7 +7306,7 @@
           <p:cNvPr id="1025" name="Picture 3">
             <a:extLst>
               <a:ext uri="{FF2B5EF4-FFF2-40B4-BE49-F238E27FC236}">
-                <a16:creationId xmlns:a16="http://schemas.microsoft.com/office/drawing/2014/main" xmlns="" id="{79BFDD3F-E24A-4142-854D-A7B082499245}"/>
+                <a16:creationId xmlns="" xmlns:a16="http://schemas.microsoft.com/office/drawing/2014/main" id="{79BFDD3F-E24A-4142-854D-A7B082499245}"/>
               </a:ext>
             </a:extLst>
           </p:cNvPr>
@@ -7356,7 +7356,7 @@
               <p:cNvPr id="5" name="Rectangle 3">
                 <a:extLst>
                   <a:ext uri="{FF2B5EF4-FFF2-40B4-BE49-F238E27FC236}">
-                    <a16:creationId xmlns:a16="http://schemas.microsoft.com/office/drawing/2014/main" xmlns="" id="{DE7A2A4F-08F0-3E4A-907B-C3C3A334497C}"/>
+                    <a16:creationId xmlns="" xmlns:a16="http://schemas.microsoft.com/office/drawing/2014/main" id="{DE7A2A4F-08F0-3E4A-907B-C3C3A334497C}"/>
                   </a:ext>
                 </a:extLst>
               </p:cNvPr>
@@ -8299,7 +8299,7 @@
           <p:cNvPr id="7" name="TextBox 6">
             <a:extLst>
               <a:ext uri="{FF2B5EF4-FFF2-40B4-BE49-F238E27FC236}">
-                <a16:creationId xmlns:a16="http://schemas.microsoft.com/office/drawing/2014/main" xmlns="" id="{7F181DB2-22DD-9A47-82B0-6B9D3CC658C7}"/>
+                <a16:creationId xmlns="" xmlns:a16="http://schemas.microsoft.com/office/drawing/2014/main" id="{7F181DB2-22DD-9A47-82B0-6B9D3CC658C7}"/>
               </a:ext>
             </a:extLst>
           </p:cNvPr>
@@ -8350,7 +8350,7 @@
           <p:cNvPr id="8" name="Picture 7">
             <a:extLst>
               <a:ext uri="{FF2B5EF4-FFF2-40B4-BE49-F238E27FC236}">
-                <a16:creationId xmlns:a16="http://schemas.microsoft.com/office/drawing/2014/main" xmlns="" id="{DEE0CFF8-25B7-0B46-B294-A464B055CA75}"/>
+                <a16:creationId xmlns="" xmlns:a16="http://schemas.microsoft.com/office/drawing/2014/main" id="{DEE0CFF8-25B7-0B46-B294-A464B055CA75}"/>
               </a:ext>
             </a:extLst>
           </p:cNvPr>
@@ -8387,7 +8387,7 @@
           <p:cNvPr id="9" name="Group 8">
             <a:extLst>
               <a:ext uri="{FF2B5EF4-FFF2-40B4-BE49-F238E27FC236}">
-                <a16:creationId xmlns:a16="http://schemas.microsoft.com/office/drawing/2014/main" xmlns="" id="{A655827A-6F52-CE4E-AC52-1FD03044710C}"/>
+                <a16:creationId xmlns="" xmlns:a16="http://schemas.microsoft.com/office/drawing/2014/main" id="{A655827A-6F52-CE4E-AC52-1FD03044710C}"/>
               </a:ext>
             </a:extLst>
           </p:cNvPr>
@@ -8407,7 +8407,7 @@
             <p:cNvPr id="10" name="Picture 9">
               <a:extLst>
                 <a:ext uri="{FF2B5EF4-FFF2-40B4-BE49-F238E27FC236}">
-                  <a16:creationId xmlns:a16="http://schemas.microsoft.com/office/drawing/2014/main" xmlns="" id="{B9EB7EDA-7AD4-624A-9DBD-048CE001B77E}"/>
+                  <a16:creationId xmlns="" xmlns:a16="http://schemas.microsoft.com/office/drawing/2014/main" id="{B9EB7EDA-7AD4-624A-9DBD-048CE001B77E}"/>
                 </a:ext>
               </a:extLst>
             </p:cNvPr>
@@ -8444,7 +8444,7 @@
             <p:cNvPr id="11" name="Rectangle 10">
               <a:extLst>
                 <a:ext uri="{FF2B5EF4-FFF2-40B4-BE49-F238E27FC236}">
-                  <a16:creationId xmlns:a16="http://schemas.microsoft.com/office/drawing/2014/main" xmlns="" id="{FE4DC9F5-79A0-614B-A06F-50EE6D163810}"/>
+                  <a16:creationId xmlns="" xmlns:a16="http://schemas.microsoft.com/office/drawing/2014/main" id="{FE4DC9F5-79A0-614B-A06F-50EE6D163810}"/>
                 </a:ext>
               </a:extLst>
             </p:cNvPr>
@@ -8718,7 +8718,7 @@
           <p:cNvPr id="4" name="Picture 3">
             <a:extLst>
               <a:ext uri="{FF2B5EF4-FFF2-40B4-BE49-F238E27FC236}">
-                <a16:creationId xmlns:a16="http://schemas.microsoft.com/office/drawing/2014/main" xmlns="" id="{66C8E1CB-517D-AD42-906C-F86AE4DA5851}"/>
+                <a16:creationId xmlns="" xmlns:a16="http://schemas.microsoft.com/office/drawing/2014/main" id="{66C8E1CB-517D-AD42-906C-F86AE4DA5851}"/>
               </a:ext>
             </a:extLst>
           </p:cNvPr>
@@ -8753,7 +8753,7 @@
           <p:cNvPr id="5" name="Picture 4">
             <a:extLst>
               <a:ext uri="{FF2B5EF4-FFF2-40B4-BE49-F238E27FC236}">
-                <a16:creationId xmlns:a16="http://schemas.microsoft.com/office/drawing/2014/main" xmlns="" id="{E79F0122-5715-5C48-B958-04F36926EAC2}"/>
+                <a16:creationId xmlns="" xmlns:a16="http://schemas.microsoft.com/office/drawing/2014/main" id="{E79F0122-5715-5C48-B958-04F36926EAC2}"/>
               </a:ext>
             </a:extLst>
           </p:cNvPr>
@@ -8781,7 +8781,7 @@
           <p:cNvPr id="2" name="Rectangle 1">
             <a:extLst>
               <a:ext uri="{FF2B5EF4-FFF2-40B4-BE49-F238E27FC236}">
-                <a16:creationId xmlns:a16="http://schemas.microsoft.com/office/drawing/2014/main" xmlns="" id="{18F83196-BF1B-3E4E-A28D-50412944756E}"/>
+                <a16:creationId xmlns="" xmlns:a16="http://schemas.microsoft.com/office/drawing/2014/main" id="{18F83196-BF1B-3E4E-A28D-50412944756E}"/>
               </a:ext>
             </a:extLst>
           </p:cNvPr>
@@ -8872,7 +8872,7 @@
           <p:cNvPr id="2" name="Rectangle 1">
             <a:extLst>
               <a:ext uri="{FF2B5EF4-FFF2-40B4-BE49-F238E27FC236}">
-                <a16:creationId xmlns:a16="http://schemas.microsoft.com/office/drawing/2014/main" xmlns="" id="{B1BD2FFC-58B8-1D42-8B9D-9F310D6FFCF9}"/>
+                <a16:creationId xmlns="" xmlns:a16="http://schemas.microsoft.com/office/drawing/2014/main" id="{B1BD2FFC-58B8-1D42-8B9D-9F310D6FFCF9}"/>
               </a:ext>
             </a:extLst>
           </p:cNvPr>
@@ -8975,7 +8975,7 @@
           <p:cNvPr id="3" name="Picture 2">
             <a:extLst>
               <a:ext uri="{FF2B5EF4-FFF2-40B4-BE49-F238E27FC236}">
-                <a16:creationId xmlns:a16="http://schemas.microsoft.com/office/drawing/2014/main" xmlns="" id="{EC917D57-C309-EA4D-BD3B-7FFC2F554D12}"/>
+                <a16:creationId xmlns="" xmlns:a16="http://schemas.microsoft.com/office/drawing/2014/main" id="{EC917D57-C309-EA4D-BD3B-7FFC2F554D12}"/>
               </a:ext>
             </a:extLst>
           </p:cNvPr>
@@ -9016,7 +9016,7 @@
               <p:cNvPr id="4" name="Rectangle 3">
                 <a:extLst>
                   <a:ext uri="{FF2B5EF4-FFF2-40B4-BE49-F238E27FC236}">
-                    <a16:creationId xmlns:a16="http://schemas.microsoft.com/office/drawing/2014/main" xmlns="" id="{4D299FD9-D513-9948-BF0C-2CD541022612}"/>
+                    <a16:creationId xmlns="" xmlns:a16="http://schemas.microsoft.com/office/drawing/2014/main" id="{4D299FD9-D513-9948-BF0C-2CD541022612}"/>
                   </a:ext>
                 </a:extLst>
               </p:cNvPr>
@@ -9312,7 +9312,7 @@
               <p:cNvPr id="5" name="Rectangle 4">
                 <a:extLst>
                   <a:ext uri="{FF2B5EF4-FFF2-40B4-BE49-F238E27FC236}">
-                    <a16:creationId xmlns:a16="http://schemas.microsoft.com/office/drawing/2014/main" xmlns="" id="{390F84F3-3DC2-5841-896D-383B01861160}"/>
+                    <a16:creationId xmlns="" xmlns:a16="http://schemas.microsoft.com/office/drawing/2014/main" id="{390F84F3-3DC2-5841-896D-383B01861160}"/>
                   </a:ext>
                 </a:extLst>
               </p:cNvPr>
@@ -9674,7 +9674,7 @@
               <p:cNvPr id="6" name="Rectangle 5">
                 <a:extLst>
                   <a:ext uri="{FF2B5EF4-FFF2-40B4-BE49-F238E27FC236}">
-                    <a16:creationId xmlns:a16="http://schemas.microsoft.com/office/drawing/2014/main" xmlns="" id="{F535F93C-6FD2-9846-AC46-5C4FDC0722E8}"/>
+                    <a16:creationId xmlns="" xmlns:a16="http://schemas.microsoft.com/office/drawing/2014/main" id="{F535F93C-6FD2-9846-AC46-5C4FDC0722E8}"/>
                   </a:ext>
                 </a:extLst>
               </p:cNvPr>
@@ -9861,7 +9861,7 @@
               <p:cNvPr id="7" name="Rectangle 6">
                 <a:extLst>
                   <a:ext uri="{FF2B5EF4-FFF2-40B4-BE49-F238E27FC236}">
-                    <a16:creationId xmlns:a16="http://schemas.microsoft.com/office/drawing/2014/main" xmlns="" id="{39399D5D-A25A-C442-B3A5-AB36800DDAC5}"/>
+                    <a16:creationId xmlns="" xmlns:a16="http://schemas.microsoft.com/office/drawing/2014/main" id="{39399D5D-A25A-C442-B3A5-AB36800DDAC5}"/>
                   </a:ext>
                 </a:extLst>
               </p:cNvPr>
@@ -10135,7 +10135,7 @@
           <p:cNvPr id="9" name="Rectangle 8">
             <a:extLst>
               <a:ext uri="{FF2B5EF4-FFF2-40B4-BE49-F238E27FC236}">
-                <a16:creationId xmlns:a16="http://schemas.microsoft.com/office/drawing/2014/main" xmlns="" id="{F58B2E6D-49B2-2144-8B69-678D461F78E5}"/>
+                <a16:creationId xmlns="" xmlns:a16="http://schemas.microsoft.com/office/drawing/2014/main" id="{F58B2E6D-49B2-2144-8B69-678D461F78E5}"/>
               </a:ext>
             </a:extLst>
           </p:cNvPr>
@@ -10227,7 +10227,7 @@
               <p:cNvPr id="3" name="Rectangle 2">
                 <a:extLst>
                   <a:ext uri="{FF2B5EF4-FFF2-40B4-BE49-F238E27FC236}">
-                    <a16:creationId xmlns:a16="http://schemas.microsoft.com/office/drawing/2014/main" xmlns="" id="{1EF45EC7-C894-7443-AC93-19F0B24D6EC0}"/>
+                    <a16:creationId xmlns="" xmlns:a16="http://schemas.microsoft.com/office/drawing/2014/main" id="{1EF45EC7-C894-7443-AC93-19F0B24D6EC0}"/>
                   </a:ext>
                 </a:extLst>
               </p:cNvPr>
@@ -11499,7 +11499,7 @@
               <p:cNvPr id="2" name="Rectangle 1">
                 <a:extLst>
                   <a:ext uri="{FF2B5EF4-FFF2-40B4-BE49-F238E27FC236}">
-                    <a16:creationId xmlns:a16="http://schemas.microsoft.com/office/drawing/2014/main" xmlns="" id="{B8C0C29A-876D-4746-9E3F-084C30E10D76}"/>
+                    <a16:creationId xmlns="" xmlns:a16="http://schemas.microsoft.com/office/drawing/2014/main" id="{B8C0C29A-876D-4746-9E3F-084C30E10D76}"/>
                   </a:ext>
                 </a:extLst>
               </p:cNvPr>
@@ -11699,7 +11699,7 @@
               <p:cNvPr id="3" name="TextBox 2">
                 <a:extLst>
                   <a:ext uri="{FF2B5EF4-FFF2-40B4-BE49-F238E27FC236}">
-                    <a16:creationId xmlns:a16="http://schemas.microsoft.com/office/drawing/2014/main" xmlns="" id="{980748E4-57AA-EC40-883F-6E79A40491D0}"/>
+                    <a16:creationId xmlns="" xmlns:a16="http://schemas.microsoft.com/office/drawing/2014/main" id="{980748E4-57AA-EC40-883F-6E79A40491D0}"/>
                   </a:ext>
                 </a:extLst>
               </p:cNvPr>
@@ -11926,7 +11926,7 @@
               <p:cNvPr id="4" name="Rectangle 3">
                 <a:extLst>
                   <a:ext uri="{FF2B5EF4-FFF2-40B4-BE49-F238E27FC236}">
-                    <a16:creationId xmlns:a16="http://schemas.microsoft.com/office/drawing/2014/main" xmlns="" id="{E2C6EA2E-1146-8D4F-A935-29C4A0A15118}"/>
+                    <a16:creationId xmlns="" xmlns:a16="http://schemas.microsoft.com/office/drawing/2014/main" id="{E2C6EA2E-1146-8D4F-A935-29C4A0A15118}"/>
                   </a:ext>
                 </a:extLst>
               </p:cNvPr>
@@ -13632,7 +13632,7 @@
           <p:cNvPr id="5" name="Rectangle 4">
             <a:extLst>
               <a:ext uri="{FF2B5EF4-FFF2-40B4-BE49-F238E27FC236}">
-                <a16:creationId xmlns:a16="http://schemas.microsoft.com/office/drawing/2014/main" xmlns="" id="{40FEB020-3153-594E-9247-322F0A4978DC}"/>
+                <a16:creationId xmlns="" xmlns:a16="http://schemas.microsoft.com/office/drawing/2014/main" id="{40FEB020-3153-594E-9247-322F0A4978DC}"/>
               </a:ext>
             </a:extLst>
           </p:cNvPr>
@@ -13691,7 +13691,7 @@
           <p:cNvPr id="7" name="Straight Arrow Connector 6">
             <a:extLst>
               <a:ext uri="{FF2B5EF4-FFF2-40B4-BE49-F238E27FC236}">
-                <a16:creationId xmlns:a16="http://schemas.microsoft.com/office/drawing/2014/main" xmlns="" id="{938A3CF5-B9E3-684F-A044-4E6660762495}"/>
+                <a16:creationId xmlns="" xmlns:a16="http://schemas.microsoft.com/office/drawing/2014/main" id="{938A3CF5-B9E3-684F-A044-4E6660762495}"/>
               </a:ext>
             </a:extLst>
           </p:cNvPr>
@@ -13735,7 +13735,7 @@
           <p:cNvPr id="8" name="Straight Arrow Connector 7">
             <a:extLst>
               <a:ext uri="{FF2B5EF4-FFF2-40B4-BE49-F238E27FC236}">
-                <a16:creationId xmlns:a16="http://schemas.microsoft.com/office/drawing/2014/main" xmlns="" id="{74596917-9362-B344-A97C-0328C2A78114}"/>
+                <a16:creationId xmlns="" xmlns:a16="http://schemas.microsoft.com/office/drawing/2014/main" id="{74596917-9362-B344-A97C-0328C2A78114}"/>
               </a:ext>
             </a:extLst>
           </p:cNvPr>
@@ -13779,7 +13779,7 @@
           <p:cNvPr id="11" name="TextBox 10">
             <a:extLst>
               <a:ext uri="{FF2B5EF4-FFF2-40B4-BE49-F238E27FC236}">
-                <a16:creationId xmlns:a16="http://schemas.microsoft.com/office/drawing/2014/main" xmlns="" id="{0EE7FAF6-ADC6-734B-8882-80E12B6AFAA2}"/>
+                <a16:creationId xmlns="" xmlns:a16="http://schemas.microsoft.com/office/drawing/2014/main" id="{0EE7FAF6-ADC6-734B-8882-80E12B6AFAA2}"/>
               </a:ext>
             </a:extLst>
           </p:cNvPr>
@@ -13818,7 +13818,7 @@
           <p:cNvPr id="12" name="TextBox 11">
             <a:extLst>
               <a:ext uri="{FF2B5EF4-FFF2-40B4-BE49-F238E27FC236}">
-                <a16:creationId xmlns:a16="http://schemas.microsoft.com/office/drawing/2014/main" xmlns="" id="{40AE682C-384A-4749-AE3C-0EA66BF53695}"/>
+                <a16:creationId xmlns="" xmlns:a16="http://schemas.microsoft.com/office/drawing/2014/main" id="{40AE682C-384A-4749-AE3C-0EA66BF53695}"/>
               </a:ext>
             </a:extLst>
           </p:cNvPr>
@@ -14648,7 +14648,7 @@
           <p:cNvPr id="4" name="Group 3">
             <a:extLst>
               <a:ext uri="{FF2B5EF4-FFF2-40B4-BE49-F238E27FC236}">
-                <a16:creationId xmlns:a16="http://schemas.microsoft.com/office/drawing/2014/main" xmlns="" id="{86B7C526-CD19-4DF4-8137-086E31C4A030}"/>
+                <a16:creationId xmlns="" xmlns:a16="http://schemas.microsoft.com/office/drawing/2014/main" id="{86B7C526-CD19-4DF4-8137-086E31C4A030}"/>
               </a:ext>
             </a:extLst>
           </p:cNvPr>
@@ -14668,7 +14668,7 @@
             <p:cNvPr id="5" name="Picture 4">
               <a:extLst>
                 <a:ext uri="{FF2B5EF4-FFF2-40B4-BE49-F238E27FC236}">
-                  <a16:creationId xmlns:a16="http://schemas.microsoft.com/office/drawing/2014/main" xmlns="" id="{783C6FF8-ABA8-4951-AB1C-6CCDB7BEBC35}"/>
+                  <a16:creationId xmlns="" xmlns:a16="http://schemas.microsoft.com/office/drawing/2014/main" id="{783C6FF8-ABA8-4951-AB1C-6CCDB7BEBC35}"/>
                 </a:ext>
               </a:extLst>
             </p:cNvPr>
@@ -14700,7 +14700,7 @@
                 <p:cNvPr id="6" name="TextBox 5">
                   <a:extLst>
                     <a:ext uri="{FF2B5EF4-FFF2-40B4-BE49-F238E27FC236}">
-                      <a16:creationId xmlns:a16="http://schemas.microsoft.com/office/drawing/2014/main" xmlns="" id="{779647ED-046F-4F2B-A39C-4B6FDDE21FBE}"/>
+                      <a16:creationId xmlns="" xmlns:a16="http://schemas.microsoft.com/office/drawing/2014/main" id="{779647ED-046F-4F2B-A39C-4B6FDDE21FBE}"/>
                     </a:ext>
                   </a:extLst>
                 </p:cNvPr>
@@ -14796,7 +14796,7 @@
                 <p:cNvPr id="7" name="TextBox 6">
                   <a:extLst>
                     <a:ext uri="{FF2B5EF4-FFF2-40B4-BE49-F238E27FC236}">
-                      <a16:creationId xmlns:a16="http://schemas.microsoft.com/office/drawing/2014/main" xmlns="" id="{22A767F0-C831-486D-A18D-4A705AA61B28}"/>
+                      <a16:creationId xmlns="" xmlns:a16="http://schemas.microsoft.com/office/drawing/2014/main" id="{22A767F0-C831-486D-A18D-4A705AA61B28}"/>
                     </a:ext>
                   </a:extLst>
                 </p:cNvPr>
@@ -14891,7 +14891,7 @@
           <p:cNvPr id="13" name="Rectangle 12">
             <a:extLst>
               <a:ext uri="{FF2B5EF4-FFF2-40B4-BE49-F238E27FC236}">
-                <a16:creationId xmlns:a16="http://schemas.microsoft.com/office/drawing/2014/main" xmlns="" id="{29901AC2-FABA-4541-8800-CB1B9FBBEB11}"/>
+                <a16:creationId xmlns="" xmlns:a16="http://schemas.microsoft.com/office/drawing/2014/main" id="{29901AC2-FABA-4541-8800-CB1B9FBBEB11}"/>
               </a:ext>
             </a:extLst>
           </p:cNvPr>
@@ -14934,7 +14934,7 @@
           <p:cNvPr id="16" name="Group 15">
             <a:extLst>
               <a:ext uri="{FF2B5EF4-FFF2-40B4-BE49-F238E27FC236}">
-                <a16:creationId xmlns:a16="http://schemas.microsoft.com/office/drawing/2014/main" xmlns="" id="{883A0E10-9F02-4380-BF4A-9E11CD816DD3}"/>
+                <a16:creationId xmlns="" xmlns:a16="http://schemas.microsoft.com/office/drawing/2014/main" id="{883A0E10-9F02-4380-BF4A-9E11CD816DD3}"/>
               </a:ext>
             </a:extLst>
           </p:cNvPr>
@@ -14954,7 +14954,7 @@
             <p:cNvPr id="11" name="Group 10">
               <a:extLst>
                 <a:ext uri="{FF2B5EF4-FFF2-40B4-BE49-F238E27FC236}">
-                  <a16:creationId xmlns:a16="http://schemas.microsoft.com/office/drawing/2014/main" xmlns="" id="{3E735467-ACAF-4241-9E0F-7BED71ED13DC}"/>
+                  <a16:creationId xmlns="" xmlns:a16="http://schemas.microsoft.com/office/drawing/2014/main" id="{3E735467-ACAF-4241-9E0F-7BED71ED13DC}"/>
                 </a:ext>
               </a:extLst>
             </p:cNvPr>
@@ -14974,7 +14974,7 @@
               <p:cNvPr id="10" name="Group 9">
                 <a:extLst>
                   <a:ext uri="{FF2B5EF4-FFF2-40B4-BE49-F238E27FC236}">
-                    <a16:creationId xmlns:a16="http://schemas.microsoft.com/office/drawing/2014/main" xmlns="" id="{4A8546B0-FD2A-4EF2-84DD-AD7322C790D6}"/>
+                    <a16:creationId xmlns="" xmlns:a16="http://schemas.microsoft.com/office/drawing/2014/main" id="{4A8546B0-FD2A-4EF2-84DD-AD7322C790D6}"/>
                   </a:ext>
                 </a:extLst>
               </p:cNvPr>
@@ -14994,7 +14994,7 @@
                 <p:cNvPr id="2" name="Picture 1">
                   <a:extLst>
                     <a:ext uri="{FF2B5EF4-FFF2-40B4-BE49-F238E27FC236}">
-                      <a16:creationId xmlns:a16="http://schemas.microsoft.com/office/drawing/2014/main" xmlns="" id="{CD8C785B-89A3-4B45-978E-BB07E18172A4}"/>
+                      <a16:creationId xmlns="" xmlns:a16="http://schemas.microsoft.com/office/drawing/2014/main" id="{CD8C785B-89A3-4B45-978E-BB07E18172A4}"/>
                     </a:ext>
                   </a:extLst>
                 </p:cNvPr>
@@ -15024,7 +15024,7 @@
                 <p:cNvPr id="9" name="Picture 8">
                   <a:extLst>
                     <a:ext uri="{FF2B5EF4-FFF2-40B4-BE49-F238E27FC236}">
-                      <a16:creationId xmlns:a16="http://schemas.microsoft.com/office/drawing/2014/main" xmlns="" id="{B26EE0CE-D17C-4655-ABC0-FBB5AFCBEE8F}"/>
+                      <a16:creationId xmlns="" xmlns:a16="http://schemas.microsoft.com/office/drawing/2014/main" id="{B26EE0CE-D17C-4655-ABC0-FBB5AFCBEE8F}"/>
                     </a:ext>
                   </a:extLst>
                 </p:cNvPr>
@@ -15055,7 +15055,7 @@
               <p:cNvPr id="12" name="Picture 11">
                 <a:extLst>
                   <a:ext uri="{FF2B5EF4-FFF2-40B4-BE49-F238E27FC236}">
-                    <a16:creationId xmlns:a16="http://schemas.microsoft.com/office/drawing/2014/main" xmlns="" id="{11B74AEA-D3A2-418F-B0D6-A87AA1B53B9F}"/>
+                    <a16:creationId xmlns="" xmlns:a16="http://schemas.microsoft.com/office/drawing/2014/main" id="{11B74AEA-D3A2-418F-B0D6-A87AA1B53B9F}"/>
                   </a:ext>
                 </a:extLst>
               </p:cNvPr>
@@ -15086,7 +15086,7 @@
             <p:cNvPr id="15" name="Straight Connector 14">
               <a:extLst>
                 <a:ext uri="{FF2B5EF4-FFF2-40B4-BE49-F238E27FC236}">
-                  <a16:creationId xmlns:a16="http://schemas.microsoft.com/office/drawing/2014/main" xmlns="" id="{A2081422-86AB-4414-BCB6-FED71ACD9075}"/>
+                  <a16:creationId xmlns="" xmlns:a16="http://schemas.microsoft.com/office/drawing/2014/main" id="{A2081422-86AB-4414-BCB6-FED71ACD9075}"/>
                 </a:ext>
               </a:extLst>
             </p:cNvPr>
@@ -15264,7 +15264,7 @@
           <p:cNvPr id="13" name="Group 12">
             <a:extLst>
               <a:ext uri="{FF2B5EF4-FFF2-40B4-BE49-F238E27FC236}">
-                <a16:creationId xmlns:a16="http://schemas.microsoft.com/office/drawing/2014/main" xmlns="" id="{F6843F7F-7966-44FD-8F13-42E6F2A68F8B}"/>
+                <a16:creationId xmlns="" xmlns:a16="http://schemas.microsoft.com/office/drawing/2014/main" id="{F6843F7F-7966-44FD-8F13-42E6F2A68F8B}"/>
               </a:ext>
             </a:extLst>
           </p:cNvPr>
@@ -15284,7 +15284,7 @@
             <p:cNvPr id="14" name="Group 13">
               <a:extLst>
                 <a:ext uri="{FF2B5EF4-FFF2-40B4-BE49-F238E27FC236}">
-                  <a16:creationId xmlns:a16="http://schemas.microsoft.com/office/drawing/2014/main" xmlns="" id="{004FF258-D667-48D2-A15F-8B154283FBAA}"/>
+                  <a16:creationId xmlns="" xmlns:a16="http://schemas.microsoft.com/office/drawing/2014/main" id="{004FF258-D667-48D2-A15F-8B154283FBAA}"/>
                 </a:ext>
               </a:extLst>
             </p:cNvPr>
@@ -15304,7 +15304,7 @@
               <p:cNvPr id="16" name="Group 15">
                 <a:extLst>
                   <a:ext uri="{FF2B5EF4-FFF2-40B4-BE49-F238E27FC236}">
-                    <a16:creationId xmlns:a16="http://schemas.microsoft.com/office/drawing/2014/main" xmlns="" id="{CAC47923-DD77-4A1C-8ADA-C10034870ADE}"/>
+                    <a16:creationId xmlns="" xmlns:a16="http://schemas.microsoft.com/office/drawing/2014/main" id="{CAC47923-DD77-4A1C-8ADA-C10034870ADE}"/>
                   </a:ext>
                 </a:extLst>
               </p:cNvPr>
@@ -15324,7 +15324,7 @@
                 <p:cNvPr id="18" name="Picture 17">
                   <a:extLst>
                     <a:ext uri="{FF2B5EF4-FFF2-40B4-BE49-F238E27FC236}">
-                      <a16:creationId xmlns:a16="http://schemas.microsoft.com/office/drawing/2014/main" xmlns="" id="{5E0D07FE-567B-4B2E-9E73-6693FF6BCEB1}"/>
+                      <a16:creationId xmlns="" xmlns:a16="http://schemas.microsoft.com/office/drawing/2014/main" id="{5E0D07FE-567B-4B2E-9E73-6693FF6BCEB1}"/>
                     </a:ext>
                   </a:extLst>
                 </p:cNvPr>
@@ -15354,7 +15354,7 @@
                 <p:cNvPr id="19" name="Picture 18">
                   <a:extLst>
                     <a:ext uri="{FF2B5EF4-FFF2-40B4-BE49-F238E27FC236}">
-                      <a16:creationId xmlns:a16="http://schemas.microsoft.com/office/drawing/2014/main" xmlns="" id="{558FE795-C1EE-4AF9-9753-5D8E9BFB0C5C}"/>
+                      <a16:creationId xmlns="" xmlns:a16="http://schemas.microsoft.com/office/drawing/2014/main" id="{558FE795-C1EE-4AF9-9753-5D8E9BFB0C5C}"/>
                     </a:ext>
                   </a:extLst>
                 </p:cNvPr>
@@ -15385,7 +15385,7 @@
               <p:cNvPr id="17" name="Picture 16">
                 <a:extLst>
                   <a:ext uri="{FF2B5EF4-FFF2-40B4-BE49-F238E27FC236}">
-                    <a16:creationId xmlns:a16="http://schemas.microsoft.com/office/drawing/2014/main" xmlns="" id="{D9DB0A0A-F102-472C-8052-8046319FDA0B}"/>
+                    <a16:creationId xmlns="" xmlns:a16="http://schemas.microsoft.com/office/drawing/2014/main" id="{D9DB0A0A-F102-472C-8052-8046319FDA0B}"/>
                   </a:ext>
                 </a:extLst>
               </p:cNvPr>
@@ -15416,7 +15416,7 @@
             <p:cNvPr id="15" name="Straight Connector 14">
               <a:extLst>
                 <a:ext uri="{FF2B5EF4-FFF2-40B4-BE49-F238E27FC236}">
-                  <a16:creationId xmlns:a16="http://schemas.microsoft.com/office/drawing/2014/main" xmlns="" id="{84A73C9A-81B6-422B-B22E-F849D184641D}"/>
+                  <a16:creationId xmlns="" xmlns:a16="http://schemas.microsoft.com/office/drawing/2014/main" id="{84A73C9A-81B6-422B-B22E-F849D184641D}"/>
                 </a:ext>
               </a:extLst>
             </p:cNvPr>
@@ -15454,7 +15454,7 @@
           <p:cNvPr id="20" name="Rectangle 19">
             <a:extLst>
               <a:ext uri="{FF2B5EF4-FFF2-40B4-BE49-F238E27FC236}">
-                <a16:creationId xmlns:a16="http://schemas.microsoft.com/office/drawing/2014/main" xmlns="" id="{FA2E72E2-F6B2-4F6C-9210-B0A351D4D564}"/>
+                <a16:creationId xmlns="" xmlns:a16="http://schemas.microsoft.com/office/drawing/2014/main" id="{FA2E72E2-F6B2-4F6C-9210-B0A351D4D564}"/>
               </a:ext>
             </a:extLst>
           </p:cNvPr>
@@ -15692,7 +15692,7 @@
           <p:cNvPr id="13" name="Group 12">
             <a:extLst>
               <a:ext uri="{FF2B5EF4-FFF2-40B4-BE49-F238E27FC236}">
-                <a16:creationId xmlns:a16="http://schemas.microsoft.com/office/drawing/2014/main" xmlns="" id="{F6843F7F-7966-44FD-8F13-42E6F2A68F8B}"/>
+                <a16:creationId xmlns="" xmlns:a16="http://schemas.microsoft.com/office/drawing/2014/main" id="{F6843F7F-7966-44FD-8F13-42E6F2A68F8B}"/>
               </a:ext>
             </a:extLst>
           </p:cNvPr>
@@ -15712,7 +15712,7 @@
             <p:cNvPr id="14" name="Group 13">
               <a:extLst>
                 <a:ext uri="{FF2B5EF4-FFF2-40B4-BE49-F238E27FC236}">
-                  <a16:creationId xmlns:a16="http://schemas.microsoft.com/office/drawing/2014/main" xmlns="" id="{004FF258-D667-48D2-A15F-8B154283FBAA}"/>
+                  <a16:creationId xmlns="" xmlns:a16="http://schemas.microsoft.com/office/drawing/2014/main" id="{004FF258-D667-48D2-A15F-8B154283FBAA}"/>
                 </a:ext>
               </a:extLst>
             </p:cNvPr>
@@ -15732,7 +15732,7 @@
               <p:cNvPr id="16" name="Group 15">
                 <a:extLst>
                   <a:ext uri="{FF2B5EF4-FFF2-40B4-BE49-F238E27FC236}">
-                    <a16:creationId xmlns:a16="http://schemas.microsoft.com/office/drawing/2014/main" xmlns="" id="{CAC47923-DD77-4A1C-8ADA-C10034870ADE}"/>
+                    <a16:creationId xmlns="" xmlns:a16="http://schemas.microsoft.com/office/drawing/2014/main" id="{CAC47923-DD77-4A1C-8ADA-C10034870ADE}"/>
                   </a:ext>
                 </a:extLst>
               </p:cNvPr>
@@ -15752,7 +15752,7 @@
                 <p:cNvPr id="18" name="Picture 17">
                   <a:extLst>
                     <a:ext uri="{FF2B5EF4-FFF2-40B4-BE49-F238E27FC236}">
-                      <a16:creationId xmlns:a16="http://schemas.microsoft.com/office/drawing/2014/main" xmlns="" id="{5E0D07FE-567B-4B2E-9E73-6693FF6BCEB1}"/>
+                      <a16:creationId xmlns="" xmlns:a16="http://schemas.microsoft.com/office/drawing/2014/main" id="{5E0D07FE-567B-4B2E-9E73-6693FF6BCEB1}"/>
                     </a:ext>
                   </a:extLst>
                 </p:cNvPr>
@@ -15782,7 +15782,7 @@
                 <p:cNvPr id="19" name="Picture 18">
                   <a:extLst>
                     <a:ext uri="{FF2B5EF4-FFF2-40B4-BE49-F238E27FC236}">
-                      <a16:creationId xmlns:a16="http://schemas.microsoft.com/office/drawing/2014/main" xmlns="" id="{558FE795-C1EE-4AF9-9753-5D8E9BFB0C5C}"/>
+                      <a16:creationId xmlns="" xmlns:a16="http://schemas.microsoft.com/office/drawing/2014/main" id="{558FE795-C1EE-4AF9-9753-5D8E9BFB0C5C}"/>
                     </a:ext>
                   </a:extLst>
                 </p:cNvPr>
@@ -15813,7 +15813,7 @@
               <p:cNvPr id="17" name="Picture 16">
                 <a:extLst>
                   <a:ext uri="{FF2B5EF4-FFF2-40B4-BE49-F238E27FC236}">
-                    <a16:creationId xmlns:a16="http://schemas.microsoft.com/office/drawing/2014/main" xmlns="" id="{D9DB0A0A-F102-472C-8052-8046319FDA0B}"/>
+                    <a16:creationId xmlns="" xmlns:a16="http://schemas.microsoft.com/office/drawing/2014/main" id="{D9DB0A0A-F102-472C-8052-8046319FDA0B}"/>
                   </a:ext>
                 </a:extLst>
               </p:cNvPr>
@@ -15844,7 +15844,7 @@
             <p:cNvPr id="15" name="Straight Connector 14">
               <a:extLst>
                 <a:ext uri="{FF2B5EF4-FFF2-40B4-BE49-F238E27FC236}">
-                  <a16:creationId xmlns:a16="http://schemas.microsoft.com/office/drawing/2014/main" xmlns="" id="{84A73C9A-81B6-422B-B22E-F849D184641D}"/>
+                  <a16:creationId xmlns="" xmlns:a16="http://schemas.microsoft.com/office/drawing/2014/main" id="{84A73C9A-81B6-422B-B22E-F849D184641D}"/>
                 </a:ext>
               </a:extLst>
             </p:cNvPr>
@@ -15882,7 +15882,7 @@
           <p:cNvPr id="20" name="Rectangle 19">
             <a:extLst>
               <a:ext uri="{FF2B5EF4-FFF2-40B4-BE49-F238E27FC236}">
-                <a16:creationId xmlns:a16="http://schemas.microsoft.com/office/drawing/2014/main" xmlns="" id="{FA2E72E2-F6B2-4F6C-9210-B0A351D4D564}"/>
+                <a16:creationId xmlns="" xmlns:a16="http://schemas.microsoft.com/office/drawing/2014/main" id="{FA2E72E2-F6B2-4F6C-9210-B0A351D4D564}"/>
               </a:ext>
             </a:extLst>
           </p:cNvPr>
@@ -19556,7 +19556,7 @@
           <p:cNvPr id="4" name="Oval 3">
             <a:extLst>
               <a:ext uri="{FF2B5EF4-FFF2-40B4-BE49-F238E27FC236}">
-                <a16:creationId xmlns:a16="http://schemas.microsoft.com/office/drawing/2014/main" xmlns="" id="{CB24680E-7B89-4226-8C75-78973A1AFF33}"/>
+                <a16:creationId xmlns="" xmlns:a16="http://schemas.microsoft.com/office/drawing/2014/main" id="{CB24680E-7B89-4226-8C75-78973A1AFF33}"/>
               </a:ext>
             </a:extLst>
           </p:cNvPr>
@@ -19603,7 +19603,7 @@
           <p:cNvPr id="9" name="Oval 8">
             <a:extLst>
               <a:ext uri="{FF2B5EF4-FFF2-40B4-BE49-F238E27FC236}">
-                <a16:creationId xmlns:a16="http://schemas.microsoft.com/office/drawing/2014/main" xmlns="" id="{AAFCD8D7-68FC-4D02-AD26-EC9C5A62B56F}"/>
+                <a16:creationId xmlns="" xmlns:a16="http://schemas.microsoft.com/office/drawing/2014/main" id="{AAFCD8D7-68FC-4D02-AD26-EC9C5A62B56F}"/>
               </a:ext>
             </a:extLst>
           </p:cNvPr>
@@ -19657,7 +19657,7 @@
           <p:cNvPr id="12" name="Straight Arrow Connector 11">
             <a:extLst>
               <a:ext uri="{FF2B5EF4-FFF2-40B4-BE49-F238E27FC236}">
-                <a16:creationId xmlns:a16="http://schemas.microsoft.com/office/drawing/2014/main" xmlns="" id="{6797B567-6B7D-48E7-9689-2028D94E1B5E}"/>
+                <a16:creationId xmlns="" xmlns:a16="http://schemas.microsoft.com/office/drawing/2014/main" id="{6797B567-6B7D-48E7-9689-2028D94E1B5E}"/>
               </a:ext>
             </a:extLst>
           </p:cNvPr>
@@ -19698,7 +19698,7 @@
           <p:cNvPr id="26" name="Straight Connector 25">
             <a:extLst>
               <a:ext uri="{FF2B5EF4-FFF2-40B4-BE49-F238E27FC236}">
-                <a16:creationId xmlns:a16="http://schemas.microsoft.com/office/drawing/2014/main" xmlns="" id="{5C9B219D-0CBD-4151-B3EA-F31B34A85D70}"/>
+                <a16:creationId xmlns="" xmlns:a16="http://schemas.microsoft.com/office/drawing/2014/main" id="{5C9B219D-0CBD-4151-B3EA-F31B34A85D70}"/>
               </a:ext>
             </a:extLst>
           </p:cNvPr>
@@ -19739,7 +19739,7 @@
           <p:cNvPr id="27" name="Straight Connector 26">
             <a:extLst>
               <a:ext uri="{FF2B5EF4-FFF2-40B4-BE49-F238E27FC236}">
-                <a16:creationId xmlns:a16="http://schemas.microsoft.com/office/drawing/2014/main" xmlns="" id="{2FE8C7CE-13EB-4134-A5ED-26AAF2A6D84A}"/>
+                <a16:creationId xmlns="" xmlns:a16="http://schemas.microsoft.com/office/drawing/2014/main" id="{2FE8C7CE-13EB-4134-A5ED-26AAF2A6D84A}"/>
               </a:ext>
             </a:extLst>
           </p:cNvPr>
@@ -20234,7 +20234,7 @@
           <p:cNvPr id="4" name="Oval 3">
             <a:extLst>
               <a:ext uri="{FF2B5EF4-FFF2-40B4-BE49-F238E27FC236}">
-                <a16:creationId xmlns:a16="http://schemas.microsoft.com/office/drawing/2014/main" xmlns="" id="{CB24680E-7B89-4226-8C75-78973A1AFF33}"/>
+                <a16:creationId xmlns="" xmlns:a16="http://schemas.microsoft.com/office/drawing/2014/main" id="{CB24680E-7B89-4226-8C75-78973A1AFF33}"/>
               </a:ext>
             </a:extLst>
           </p:cNvPr>
@@ -20281,7 +20281,7 @@
           <p:cNvPr id="9" name="Oval 8">
             <a:extLst>
               <a:ext uri="{FF2B5EF4-FFF2-40B4-BE49-F238E27FC236}">
-                <a16:creationId xmlns:a16="http://schemas.microsoft.com/office/drawing/2014/main" xmlns="" id="{AAFCD8D7-68FC-4D02-AD26-EC9C5A62B56F}"/>
+                <a16:creationId xmlns="" xmlns:a16="http://schemas.microsoft.com/office/drawing/2014/main" id="{AAFCD8D7-68FC-4D02-AD26-EC9C5A62B56F}"/>
               </a:ext>
             </a:extLst>
           </p:cNvPr>
@@ -20335,7 +20335,7 @@
           <p:cNvPr id="12" name="Straight Arrow Connector 11">
             <a:extLst>
               <a:ext uri="{FF2B5EF4-FFF2-40B4-BE49-F238E27FC236}">
-                <a16:creationId xmlns:a16="http://schemas.microsoft.com/office/drawing/2014/main" xmlns="" id="{6797B567-6B7D-48E7-9689-2028D94E1B5E}"/>
+                <a16:creationId xmlns="" xmlns:a16="http://schemas.microsoft.com/office/drawing/2014/main" id="{6797B567-6B7D-48E7-9689-2028D94E1B5E}"/>
               </a:ext>
             </a:extLst>
           </p:cNvPr>
@@ -20376,7 +20376,7 @@
           <p:cNvPr id="26" name="Straight Connector 25">
             <a:extLst>
               <a:ext uri="{FF2B5EF4-FFF2-40B4-BE49-F238E27FC236}">
-                <a16:creationId xmlns:a16="http://schemas.microsoft.com/office/drawing/2014/main" xmlns="" id="{5C9B219D-0CBD-4151-B3EA-F31B34A85D70}"/>
+                <a16:creationId xmlns="" xmlns:a16="http://schemas.microsoft.com/office/drawing/2014/main" id="{5C9B219D-0CBD-4151-B3EA-F31B34A85D70}"/>
               </a:ext>
             </a:extLst>
           </p:cNvPr>
@@ -20417,7 +20417,7 @@
           <p:cNvPr id="27" name="Straight Connector 26">
             <a:extLst>
               <a:ext uri="{FF2B5EF4-FFF2-40B4-BE49-F238E27FC236}">
-                <a16:creationId xmlns:a16="http://schemas.microsoft.com/office/drawing/2014/main" xmlns="" id="{2FE8C7CE-13EB-4134-A5ED-26AAF2A6D84A}"/>
+                <a16:creationId xmlns="" xmlns:a16="http://schemas.microsoft.com/office/drawing/2014/main" id="{2FE8C7CE-13EB-4134-A5ED-26AAF2A6D84A}"/>
               </a:ext>
             </a:extLst>
           </p:cNvPr>
@@ -21575,7 +21575,7 @@
           <p:cNvPr id="12" name="Group 11">
             <a:extLst>
               <a:ext uri="{FF2B5EF4-FFF2-40B4-BE49-F238E27FC236}">
-                <a16:creationId xmlns:a16="http://schemas.microsoft.com/office/drawing/2014/main" xmlns="" id="{E4E43C60-F55D-4C1A-A9FC-E15B0C48B8FE}"/>
+                <a16:creationId xmlns="" xmlns:a16="http://schemas.microsoft.com/office/drawing/2014/main" id="{E4E43C60-F55D-4C1A-A9FC-E15B0C48B8FE}"/>
               </a:ext>
             </a:extLst>
           </p:cNvPr>
@@ -21623,7 +21623,7 @@
                 <p:cNvPr id="4" name="TextBox 3">
                   <a:extLst>
                     <a:ext uri="{FF2B5EF4-FFF2-40B4-BE49-F238E27FC236}">
-                      <a16:creationId xmlns:a16="http://schemas.microsoft.com/office/drawing/2014/main" xmlns="" id="{39CD8466-01BC-4287-BCD4-F44E549DFDB5}"/>
+                      <a16:creationId xmlns="" xmlns:a16="http://schemas.microsoft.com/office/drawing/2014/main" id="{39CD8466-01BC-4287-BCD4-F44E549DFDB5}"/>
                     </a:ext>
                   </a:extLst>
                 </p:cNvPr>
@@ -21718,7 +21718,7 @@
           <p:cNvPr id="13" name="Rectangle 12">
             <a:extLst>
               <a:ext uri="{FF2B5EF4-FFF2-40B4-BE49-F238E27FC236}">
-                <a16:creationId xmlns:a16="http://schemas.microsoft.com/office/drawing/2014/main" xmlns="" id="{1225D1A9-A673-4401-96E4-37FDAE5C8415}"/>
+                <a16:creationId xmlns="" xmlns:a16="http://schemas.microsoft.com/office/drawing/2014/main" id="{1225D1A9-A673-4401-96E4-37FDAE5C8415}"/>
               </a:ext>
             </a:extLst>
           </p:cNvPr>
@@ -21770,7 +21770,7 @@
           <p:cNvPr id="14" name="Rectangle 13">
             <a:extLst>
               <a:ext uri="{FF2B5EF4-FFF2-40B4-BE49-F238E27FC236}">
-                <a16:creationId xmlns:a16="http://schemas.microsoft.com/office/drawing/2014/main" xmlns="" id="{0E5444FB-6E91-47C3-BFD9-5E4B8A4E143F}"/>
+                <a16:creationId xmlns="" xmlns:a16="http://schemas.microsoft.com/office/drawing/2014/main" id="{0E5444FB-6E91-47C3-BFD9-5E4B8A4E143F}"/>
               </a:ext>
             </a:extLst>
           </p:cNvPr>
@@ -21824,7 +21824,7 @@
               <p:cNvPr id="15" name="TextBox 14">
                 <a:extLst>
                   <a:ext uri="{FF2B5EF4-FFF2-40B4-BE49-F238E27FC236}">
-                    <a16:creationId xmlns:a16="http://schemas.microsoft.com/office/drawing/2014/main" xmlns="" id="{25B3B9EA-2267-4997-8C5F-395602F4EEFD}"/>
+                    <a16:creationId xmlns="" xmlns:a16="http://schemas.microsoft.com/office/drawing/2014/main" id="{25B3B9EA-2267-4997-8C5F-395602F4EEFD}"/>
                   </a:ext>
                 </a:extLst>
               </p:cNvPr>
@@ -22315,7 +22315,7 @@
           <p:cNvPr id="5" name="مربع نص 1">
             <a:extLst>
               <a:ext uri="{FF2B5EF4-FFF2-40B4-BE49-F238E27FC236}">
-                <a16:creationId xmlns:a16="http://schemas.microsoft.com/office/drawing/2014/main" xmlns="" id="{7711DB52-DA0E-C95D-DFAF-CCC7BD2BE49D}"/>
+                <a16:creationId xmlns="" xmlns:a16="http://schemas.microsoft.com/office/drawing/2014/main" id="{7711DB52-DA0E-C95D-DFAF-CCC7BD2BE49D}"/>
               </a:ext>
             </a:extLst>
           </p:cNvPr>
@@ -22380,7 +22380,7 @@
           <p:cNvPr id="6" name="TextBox 5">
             <a:extLst>
               <a:ext uri="{FF2B5EF4-FFF2-40B4-BE49-F238E27FC236}">
-                <a16:creationId xmlns:a16="http://schemas.microsoft.com/office/drawing/2014/main" xmlns="" id="{C6E955C2-410D-5EE0-CFAB-8FE55D451121}"/>
+                <a16:creationId xmlns="" xmlns:a16="http://schemas.microsoft.com/office/drawing/2014/main" id="{C6E955C2-410D-5EE0-CFAB-8FE55D451121}"/>
               </a:ext>
             </a:extLst>
           </p:cNvPr>
@@ -25242,7 +25242,7 @@
           <p:cNvPr id="3" name="Picture 2">
             <a:extLst>
               <a:ext uri="{FF2B5EF4-FFF2-40B4-BE49-F238E27FC236}">
-                <a16:creationId xmlns:a16="http://schemas.microsoft.com/office/drawing/2014/main" xmlns="" id="{933E071D-9858-BBB6-BECA-A19386297CB9}"/>
+                <a16:creationId xmlns="" xmlns:a16="http://schemas.microsoft.com/office/drawing/2014/main" id="{933E071D-9858-BBB6-BECA-A19386297CB9}"/>
               </a:ext>
             </a:extLst>
           </p:cNvPr>
@@ -25327,38 +25327,8 @@
           <a:chExt cx="0" cy="0"/>
         </a:xfrm>
       </p:grpSpPr>
-      <p:pic>
-        <p:nvPicPr>
-          <p:cNvPr id="3" name="Picture 2">
-            <a:extLst>
-              <a:ext uri="{FF2B5EF4-FFF2-40B4-BE49-F238E27FC236}">
-                <a16:creationId xmlns:a16="http://schemas.microsoft.com/office/drawing/2014/main" xmlns="" id="{933E071D-9858-BBB6-BECA-A19386297CB9}"/>
-              </a:ext>
-            </a:extLst>
-          </p:cNvPr>
-          <p:cNvPicPr>
-            <a:picLocks noChangeAspect="1"/>
-          </p:cNvPicPr>
-          <p:nvPr/>
-        </p:nvPicPr>
-        <p:blipFill>
-          <a:blip r:embed="rId2"/>
-          <a:stretch>
-            <a:fillRect/>
-          </a:stretch>
-        </p:blipFill>
-        <p:spPr>
-          <a:xfrm>
-            <a:off x="3775877" y="2556893"/>
-            <a:ext cx="9087529" cy="5841984"/>
-          </a:xfrm>
-          <a:prstGeom prst="rect">
-            <a:avLst/>
-          </a:prstGeom>
-        </p:spPr>
-      </p:pic>
-      <mc:AlternateContent xmlns:mc="http://schemas.openxmlformats.org/markup-compatibility/2006">
-        <mc:Choice xmlns:a14="http://schemas.microsoft.com/office/drawing/2010/main" Requires="a14">
+      <mc:AlternateContent xmlns:mc="http://schemas.openxmlformats.org/markup-compatibility/2006" xmlns:a14="http://schemas.microsoft.com/office/drawing/2010/main">
+        <mc:Choice Requires="a14">
           <p:sp>
             <p:nvSpPr>
               <p:cNvPr id="2" name="TextBox 1"/>
@@ -25639,11 +25609,7 @@
               <a:p>
                 <a:r>
                   <a:rPr lang="en-US" sz="1400" dirty="0" smtClean="0"/>
-                  <a:t>M </a:t>
-                </a:r>
-                <a:r>
-                  <a:rPr lang="en-US" sz="1400" dirty="0" smtClean="0"/>
-                  <a:t>    V</a:t>
+                  <a:t>M     V</a:t>
                 </a:r>
                 <a:r>
                   <a:rPr lang="en-US" sz="1400" baseline="-25000" dirty="0" smtClean="0"/>
@@ -25651,11 +25617,7 @@
                 </a:r>
                 <a:r>
                   <a:rPr lang="en-US" sz="1400" dirty="0" smtClean="0"/>
-                  <a:t> </a:t>
-                </a:r>
-                <a:r>
-                  <a:rPr lang="en-US" sz="1400" dirty="0" smtClean="0"/>
-                  <a:t>= V</a:t>
+                  <a:t> = V</a:t>
                 </a:r>
                 <a:r>
                   <a:rPr lang="en-US" sz="1400" baseline="-25000" dirty="0" smtClean="0"/>
@@ -27009,7 +26971,13 @@
                                 <a:rPr lang="en-US" sz="1400" b="0" i="1" dirty="0" smtClean="0">
                                   <a:latin typeface="Cambria Math"/>
                                 </a:rPr>
-                                <m:t>1+</m:t>
+                                <m:t>1</m:t>
+                              </m:r>
+                              <m:r>
+                                <a:rPr lang="en-US" sz="1400" b="0" i="1" dirty="0" smtClean="0">
+                                  <a:latin typeface="Cambria Math"/>
+                                </a:rPr>
+                                <m:t>+</m:t>
                               </m:r>
                               <m:f>
                                 <m:fPr>
@@ -27652,7 +27620,7 @@
             </p:txBody>
           </p:sp>
         </mc:Choice>
-        <mc:Fallback>
+        <mc:Fallback xmlns="">
           <p:sp>
             <p:nvSpPr>
               <p:cNvPr id="2" name="TextBox 1"/>
@@ -27691,8 +27659,8 @@
           </p:sp>
         </mc:Fallback>
       </mc:AlternateContent>
-      <mc:AlternateContent xmlns:mc="http://schemas.openxmlformats.org/markup-compatibility/2006">
-        <mc:Choice xmlns:a14="http://schemas.microsoft.com/office/drawing/2010/main" Requires="a14">
+      <mc:AlternateContent xmlns:mc="http://schemas.openxmlformats.org/markup-compatibility/2006" xmlns:a14="http://schemas.microsoft.com/office/drawing/2010/main">
+        <mc:Choice Requires="a14">
           <p:sp>
             <p:nvSpPr>
               <p:cNvPr id="5" name="TextBox 4"/>
@@ -27728,6 +27696,7 @@
               </a:bodyPr>
               <a:lstStyle/>
               <a:p>
+                <a:pPr/>
                 <a14:m>
                   <m:oMathPara xmlns:m="http://schemas.openxmlformats.org/officeDocument/2006/math">
                     <m:oMathParaPr>
@@ -27845,6 +27814,7 @@
                 </a:endParaRPr>
               </a:p>
               <a:p>
+                <a:pPr/>
                 <a14:m>
                   <m:oMathPara xmlns:m="http://schemas.openxmlformats.org/officeDocument/2006/math">
                     <m:oMathParaPr>
@@ -27941,7 +27911,7 @@
             </p:txBody>
           </p:sp>
         </mc:Choice>
-        <mc:Fallback>
+        <mc:Fallback xmlns="">
           <p:sp>
             <p:nvSpPr>
               <p:cNvPr id="5" name="TextBox 4"/>
@@ -27990,20 +27960,34 @@
             </p:nvSpPr>
             <p:spPr>
               <a:xfrm>
-                <a:off x="4482790" y="189571"/>
-                <a:ext cx="5508702" cy="2500556"/>
+                <a:off x="5486400" y="1783546"/>
+                <a:ext cx="5508702" cy="4437625"/>
               </a:xfrm>
               <a:prstGeom prst="rect">
                 <a:avLst/>
               </a:prstGeom>
-              <a:noFill/>
             </p:spPr>
+            <p:style>
+              <a:lnRef idx="2">
+                <a:schemeClr val="dk1"/>
+              </a:lnRef>
+              <a:fillRef idx="1">
+                <a:schemeClr val="lt1"/>
+              </a:fillRef>
+              <a:effectRef idx="0">
+                <a:schemeClr val="dk1"/>
+              </a:effectRef>
+              <a:fontRef idx="minor">
+                <a:schemeClr val="dk1"/>
+              </a:fontRef>
+            </p:style>
             <p:txBody>
               <a:bodyPr wrap="square" rtlCol="0">
                 <a:spAutoFit/>
               </a:bodyPr>
               <a:lstStyle/>
               <a:p>
+                <a:pPr algn="ctr"/>
                 <a14:m>
                   <m:oMath xmlns:m="http://schemas.openxmlformats.org/officeDocument/2006/math">
                     <m:f>
@@ -28094,10 +28078,26 @@
                     </m:f>
                   </m:oMath>
                 </a14:m>
-                <a:endParaRPr lang="en-US" dirty="0" smtClean="0"/>
+                <a:r>
+                  <a:rPr lang="en-US" dirty="0" smtClean="0"/>
+                  <a:t> 	</a:t>
+                </a:r>
+                <a:r>
+                  <a:rPr lang="en-US" dirty="0" smtClean="0">
+                    <a:latin typeface="Wingdings 2" panose="05020102010507070707" pitchFamily="18" charset="2"/>
+                    <a:sym typeface="Wingdings 2"/>
+                  </a:rPr>
+                  <a:t></a:t>
+                </a:r>
               </a:p>
               <a:p>
-                <a:pPr marL="285750" indent="-285750">
+                <a:pPr algn="ctr"/>
+                <a:endParaRPr lang="en-US" dirty="0" smtClean="0">
+                  <a:latin typeface="Wingdings 2" panose="05020102010507070707" pitchFamily="18" charset="2"/>
+                </a:endParaRPr>
+              </a:p>
+              <a:p>
+                <a:pPr marL="285750" indent="-285750" algn="ctr">
                   <a:buFontTx/>
                   <a:buChar char="-"/>
                 </a:pPr>
@@ -28164,9 +28164,17 @@
                   <a:rPr lang="en-US" dirty="0" smtClean="0"/>
                   <a:t>)</a:t>
                 </a:r>
+                <a:endParaRPr lang="en-US" dirty="0" smtClean="0"/>
               </a:p>
               <a:p>
-                <a:pPr marL="285750" indent="-285750">
+                <a:pPr marL="285750" indent="-285750" algn="ctr">
+                  <a:buFontTx/>
+                  <a:buChar char="-"/>
+                </a:pPr>
+                <a:endParaRPr lang="en-US" dirty="0" smtClean="0"/>
+              </a:p>
+              <a:p>
+                <a:pPr marL="285750" indent="-285750" algn="ctr">
                   <a:buFontTx/>
                   <a:buChar char="-"/>
                 </a:pPr>
@@ -28321,7 +28329,14 @@
                 <a:endParaRPr lang="en-US" dirty="0" smtClean="0"/>
               </a:p>
               <a:p>
-                <a:pPr marL="285750" indent="-285750">
+                <a:pPr marL="285750" indent="-285750" algn="ctr">
+                  <a:buFontTx/>
+                  <a:buChar char="-"/>
+                </a:pPr>
+                <a:endParaRPr lang="en-US" dirty="0" smtClean="0"/>
+              </a:p>
+              <a:p>
+                <a:pPr marL="285750" indent="-285750" algn="ctr">
                   <a:buFontTx/>
                   <a:buChar char="-"/>
                 </a:pPr>
@@ -28421,10 +28436,16 @@
                           <m:t>𝑠</m:t>
                         </m:r>
                         <m:r>
+                          <a:rPr lang="en-US" b="0" i="1" baseline="30000" smtClean="0">
+                            <a:latin typeface="Cambria Math"/>
+                          </a:rPr>
+                          <m:t>2</m:t>
+                        </m:r>
+                        <m:r>
                           <a:rPr lang="en-US" b="0" i="1" smtClean="0">
                             <a:latin typeface="Cambria Math"/>
                           </a:rPr>
-                          <m:t>2+1.5</m:t>
+                          <m:t>+1.5</m:t>
                         </m:r>
                         <m:r>
                           <a:rPr lang="en-US" b="0" i="1" smtClean="0">
@@ -28460,28 +28481,29 @@
                       </a:rPr>
                       <m:t>𝑉𝑐</m:t>
                     </m:r>
-                    <m:d>
-                      <m:dPr>
-                        <m:ctrlPr>
-                          <a:rPr lang="en-US" b="0" i="1" baseline="-25000" smtClean="0">
-                            <a:latin typeface="Cambria Math"/>
-                          </a:rPr>
-                        </m:ctrlPr>
-                      </m:dPr>
-                      <m:e>
-                        <m:r>
-                          <a:rPr lang="en-US" b="0" i="1" smtClean="0">
-                            <a:latin typeface="Cambria Math"/>
-                          </a:rPr>
-                          <m:t>𝑠</m:t>
-                        </m:r>
-                      </m:e>
-                    </m:d>
+                    <m:r>
+                      <a:rPr lang="en-US" b="0" i="1" baseline="-25000" smtClean="0">
+                        <a:latin typeface="Cambria Math"/>
+                      </a:rPr>
+                      <m:t> </m:t>
+                    </m:r>
                     <m:r>
                       <a:rPr lang="en-US" b="0" i="1" smtClean="0">
                         <a:latin typeface="Cambria Math"/>
                       </a:rPr>
-                      <m:t>= </m:t>
+                      <m:t>(</m:t>
+                    </m:r>
+                    <m:r>
+                      <a:rPr lang="en-US" b="0" i="1" smtClean="0">
+                        <a:latin typeface="Cambria Math"/>
+                      </a:rPr>
+                      <m:t>𝑠</m:t>
+                    </m:r>
+                    <m:r>
+                      <a:rPr lang="en-US" b="0" i="1" smtClean="0">
+                        <a:latin typeface="Cambria Math"/>
+                      </a:rPr>
+                      <m:t>)= </m:t>
                     </m:r>
                     <m:f>
                       <m:fPr>
@@ -28516,15 +28538,38 @@
                     </m:f>
                   </m:oMath>
                 </a14:m>
+                <a:r>
+                  <a:rPr lang="en-US" dirty="0" smtClean="0"/>
+                  <a:t>	</a:t>
+                </a:r>
+                <a:r>
+                  <a:rPr lang="en-US" dirty="0" smtClean="0">
+                    <a:sym typeface="Wingdings 2"/>
+                  </a:rPr>
+                  <a:t></a:t>
+                </a:r>
                 <a:endParaRPr lang="en-US" dirty="0" smtClean="0"/>
               </a:p>
               <a:p>
-                <a:pPr marL="285750" indent="-285750">
+                <a:pPr marL="285750" indent="-285750" algn="ctr">
+                  <a:buFontTx/>
+                  <a:buChar char="-"/>
+                </a:pPr>
+                <a:endParaRPr lang="en-US" dirty="0" smtClean="0"/>
+              </a:p>
+              <a:p>
+                <a:pPr marL="285750" indent="-285750" algn="ctr">
                   <a:buFontTx/>
                   <a:buChar char="-"/>
                 </a:pPr>
                 <a:r>
-                  <a:rPr lang="en-US" dirty="0"/>
+                  <a:rPr lang="en-US" dirty="0" smtClean="0">
+                    <a:sym typeface="Wingdings 2"/>
+                  </a:rPr>
+                  <a:t> + </a:t>
+                </a:r>
+                <a:r>
+                  <a:rPr lang="en-US" dirty="0" smtClean="0"/>
                   <a:t> </a:t>
                 </a:r>
                 <a14:m>
@@ -28550,47 +28595,362 @@
                       </a:rPr>
                       <m:t>𝑐</m:t>
                     </m:r>
-                    <m:r>
-                      <a:rPr lang="en-US" b="0" i="1" smtClean="0">
-                        <a:latin typeface="Cambria Math"/>
-                        <a:ea typeface="Cambria Math"/>
-                      </a:rPr>
-                      <m:t>(</m:t>
-                    </m:r>
-                    <m:r>
-                      <a:rPr lang="en-US" b="0" i="1" smtClean="0">
-                        <a:latin typeface="Cambria Math"/>
-                        <a:ea typeface="Cambria Math"/>
-                      </a:rPr>
-                      <m:t>𝑠</m:t>
-                    </m:r>
-                    <m:r>
-                      <a:rPr lang="en-US" b="0" i="1" smtClean="0">
-                        <a:latin typeface="Cambria Math"/>
-                        <a:ea typeface="Cambria Math"/>
-                      </a:rPr>
-                      <m:t>)</m:t>
-                    </m:r>
+                    <m:d>
+                      <m:dPr>
+                        <m:ctrlPr>
+                          <a:rPr lang="en-US" b="0" i="1" baseline="-25000" smtClean="0">
+                            <a:latin typeface="Cambria Math"/>
+                            <a:ea typeface="Cambria Math"/>
+                          </a:rPr>
+                        </m:ctrlPr>
+                      </m:dPr>
+                      <m:e>
+                        <m:r>
+                          <a:rPr lang="en-US" b="0" i="1" smtClean="0">
+                            <a:latin typeface="Cambria Math"/>
+                            <a:ea typeface="Cambria Math"/>
+                          </a:rPr>
+                          <m:t>𝑠</m:t>
+                        </m:r>
+                      </m:e>
+                    </m:d>
+                    <m:d>
+                      <m:dPr>
+                        <m:ctrlPr>
+                          <a:rPr lang="en-US" b="0" i="0" smtClean="0">
+                            <a:latin typeface="Cambria Math"/>
+                            <a:ea typeface="Cambria Math"/>
+                          </a:rPr>
+                        </m:ctrlPr>
+                      </m:dPr>
+                      <m:e>
+                        <m:r>
+                          <m:rPr>
+                            <m:nor/>
+                          </m:rPr>
+                          <a:rPr lang="en-US" dirty="0"/>
+                          <m:t> </m:t>
+                        </m:r>
+                        <m:f>
+                          <m:fPr>
+                            <m:ctrlPr>
+                              <a:rPr lang="en-US" i="1">
+                                <a:latin typeface="Cambria Math"/>
+                              </a:rPr>
+                            </m:ctrlPr>
+                          </m:fPr>
+                          <m:num>
+                            <m:r>
+                              <a:rPr lang="en-US" i="1">
+                                <a:latin typeface="Cambria Math"/>
+                              </a:rPr>
+                              <m:t>𝑠</m:t>
+                            </m:r>
+                            <m:r>
+                              <a:rPr lang="en-US" i="1" baseline="30000">
+                                <a:latin typeface="Cambria Math"/>
+                              </a:rPr>
+                              <m:t>2</m:t>
+                            </m:r>
+                            <m:r>
+                              <a:rPr lang="en-US" i="1">
+                                <a:latin typeface="Cambria Math"/>
+                              </a:rPr>
+                              <m:t>+1.5</m:t>
+                            </m:r>
+                            <m:r>
+                              <a:rPr lang="en-US" i="1">
+                                <a:latin typeface="Cambria Math"/>
+                              </a:rPr>
+                              <m:t>𝑠</m:t>
+                            </m:r>
+                            <m:r>
+                              <a:rPr lang="en-US" i="1">
+                                <a:latin typeface="Cambria Math"/>
+                              </a:rPr>
+                              <m:t>+0.5</m:t>
+                            </m:r>
+                          </m:num>
+                          <m:den>
+                            <m:r>
+                              <a:rPr lang="en-US" i="1">
+                                <a:latin typeface="Cambria Math"/>
+                              </a:rPr>
+                              <m:t>𝑠</m:t>
+                            </m:r>
+                          </m:den>
+                        </m:f>
+                        <m:r>
+                          <a:rPr lang="en-US" b="0" i="1" smtClean="0">
+                            <a:latin typeface="Cambria Math"/>
+                          </a:rPr>
+                          <m:t> −0.5</m:t>
+                        </m:r>
+                      </m:e>
+                    </m:d>
                     <m:r>
                       <a:rPr lang="en-US" b="0" i="0" smtClean="0">
                         <a:latin typeface="Cambria Math"/>
                         <a:ea typeface="Cambria Math"/>
                       </a:rPr>
-                      <m:t>()</m:t>
+                      <m:t>=</m:t>
                     </m:r>
                   </m:oMath>
                 </a14:m>
-                <a:endParaRPr lang="en-US" dirty="0"/>
+                <a:r>
+                  <a:rPr lang="en-US" dirty="0" smtClean="0"/>
+                  <a:t> </a:t>
+                </a:r>
+                <a14:m>
+                  <m:oMath xmlns:m="http://schemas.openxmlformats.org/officeDocument/2006/math">
+                    <m:f>
+                      <m:fPr>
+                        <m:ctrlPr>
+                          <a:rPr lang="en-US" i="1">
+                            <a:latin typeface="Cambria Math"/>
+                          </a:rPr>
+                        </m:ctrlPr>
+                      </m:fPr>
+                      <m:num>
+                        <m:r>
+                          <a:rPr lang="en-US" i="1">
+                            <a:latin typeface="Cambria Math"/>
+                          </a:rPr>
+                          <m:t>𝑠</m:t>
+                        </m:r>
+                        <m:r>
+                          <a:rPr lang="en-US" i="1">
+                            <a:latin typeface="Cambria Math"/>
+                          </a:rPr>
+                          <m:t>+1</m:t>
+                        </m:r>
+                      </m:num>
+                      <m:den>
+                        <m:r>
+                          <a:rPr lang="en-US" i="1">
+                            <a:latin typeface="Cambria Math"/>
+                          </a:rPr>
+                          <m:t>𝑠</m:t>
+                        </m:r>
+                      </m:den>
+                    </m:f>
+                  </m:oMath>
+                </a14:m>
+                <a:r>
+                  <a:rPr lang="en-US" dirty="0" smtClean="0"/>
+                  <a:t> + </a:t>
+                </a:r>
+                <a14:m>
+                  <m:oMath xmlns:m="http://schemas.openxmlformats.org/officeDocument/2006/math">
+                    <m:f>
+                      <m:fPr>
+                        <m:ctrlPr>
+                          <a:rPr lang="en-US" i="1">
+                            <a:latin typeface="Cambria Math"/>
+                          </a:rPr>
+                        </m:ctrlPr>
+                      </m:fPr>
+                      <m:num>
+                        <m:r>
+                          <a:rPr lang="en-US" i="1">
+                            <a:latin typeface="Cambria Math"/>
+                          </a:rPr>
+                          <m:t>1</m:t>
+                        </m:r>
+                      </m:num>
+                      <m:den>
+                        <m:r>
+                          <a:rPr lang="en-US" i="1">
+                            <a:latin typeface="Cambria Math"/>
+                          </a:rPr>
+                          <m:t>𝑠</m:t>
+                        </m:r>
+                      </m:den>
+                    </m:f>
+                  </m:oMath>
+                </a14:m>
+                <a:endParaRPr lang="en-US" dirty="0" smtClean="0"/>
               </a:p>
               <a:p>
-                <a:pPr marL="285750" indent="-285750">
+                <a:pPr marL="285750" indent="-285750" algn="ctr">
                   <a:buFontTx/>
                   <a:buChar char="-"/>
                 </a:pPr>
                 <a:endParaRPr lang="en-US" dirty="0" smtClean="0"/>
               </a:p>
               <a:p>
-                <a:pPr marL="285750" indent="-285750">
+                <a:pPr marL="285750" indent="-285750" algn="ctr">
+                  <a:buFontTx/>
+                  <a:buChar char="-"/>
+                </a:pPr>
+                <a14:m>
+                  <m:oMath xmlns:m="http://schemas.openxmlformats.org/officeDocument/2006/math">
+                    <m:r>
+                      <a:rPr lang="en-US" i="1">
+                        <a:latin typeface="Cambria Math"/>
+                        <a:ea typeface="Cambria Math"/>
+                      </a:rPr>
+                      <m:t>𝑉</m:t>
+                    </m:r>
+                    <m:r>
+                      <a:rPr lang="en-US" i="1" baseline="-25000">
+                        <a:latin typeface="Cambria Math"/>
+                        <a:ea typeface="Cambria Math"/>
+                      </a:rPr>
+                      <m:t>𝑐</m:t>
+                    </m:r>
+                    <m:d>
+                      <m:dPr>
+                        <m:ctrlPr>
+                          <a:rPr lang="en-US" i="1" baseline="-25000">
+                            <a:latin typeface="Cambria Math"/>
+                            <a:ea typeface="Cambria Math"/>
+                          </a:rPr>
+                        </m:ctrlPr>
+                      </m:dPr>
+                      <m:e>
+                        <m:r>
+                          <a:rPr lang="en-US" i="1">
+                            <a:latin typeface="Cambria Math"/>
+                            <a:ea typeface="Cambria Math"/>
+                          </a:rPr>
+                          <m:t>𝑠</m:t>
+                        </m:r>
+                      </m:e>
+                    </m:d>
+                    <m:d>
+                      <m:dPr>
+                        <m:ctrlPr>
+                          <a:rPr lang="en-US" i="1">
+                            <a:latin typeface="Cambria Math"/>
+                            <a:ea typeface="Cambria Math"/>
+                          </a:rPr>
+                        </m:ctrlPr>
+                      </m:dPr>
+                      <m:e>
+                        <m:r>
+                          <m:rPr>
+                            <m:nor/>
+                          </m:rPr>
+                          <a:rPr lang="en-US" dirty="0"/>
+                          <m:t> </m:t>
+                        </m:r>
+                        <m:f>
+                          <m:fPr>
+                            <m:ctrlPr>
+                              <a:rPr lang="en-US" i="1">
+                                <a:latin typeface="Cambria Math"/>
+                              </a:rPr>
+                            </m:ctrlPr>
+                          </m:fPr>
+                          <m:num>
+                            <m:r>
+                              <a:rPr lang="en-US" i="1">
+                                <a:latin typeface="Cambria Math"/>
+                              </a:rPr>
+                              <m:t>𝑠</m:t>
+                            </m:r>
+                            <m:r>
+                              <a:rPr lang="en-US" i="1" baseline="30000">
+                                <a:latin typeface="Cambria Math"/>
+                              </a:rPr>
+                              <m:t>2</m:t>
+                            </m:r>
+                            <m:r>
+                              <a:rPr lang="en-US" i="1">
+                                <a:latin typeface="Cambria Math"/>
+                              </a:rPr>
+                              <m:t>+</m:t>
+                            </m:r>
+                            <m:r>
+                              <a:rPr lang="en-US" i="1">
+                                <a:latin typeface="Cambria Math"/>
+                              </a:rPr>
+                              <m:t>𝑠</m:t>
+                            </m:r>
+                            <m:r>
+                              <a:rPr lang="en-US" i="1">
+                                <a:latin typeface="Cambria Math"/>
+                              </a:rPr>
+                              <m:t>+0.5</m:t>
+                            </m:r>
+                          </m:num>
+                          <m:den>
+                            <m:r>
+                              <a:rPr lang="en-US" i="1">
+                                <a:latin typeface="Cambria Math"/>
+                              </a:rPr>
+                              <m:t>𝑠</m:t>
+                            </m:r>
+                          </m:den>
+                        </m:f>
+                        <m:r>
+                          <a:rPr lang="en-US" i="1">
+                            <a:latin typeface="Cambria Math"/>
+                          </a:rPr>
+                          <m:t> −0.5</m:t>
+                        </m:r>
+                      </m:e>
+                    </m:d>
+                    <m:r>
+                      <a:rPr lang="en-US">
+                        <a:latin typeface="Cambria Math"/>
+                        <a:ea typeface="Cambria Math"/>
+                      </a:rPr>
+                      <m:t>=</m:t>
+                    </m:r>
+                  </m:oMath>
+                </a14:m>
+                <a:r>
+                  <a:rPr lang="en-US" dirty="0"/>
+                  <a:t> </a:t>
+                </a:r>
+                <a14:m>
+                  <m:oMath xmlns:m="http://schemas.openxmlformats.org/officeDocument/2006/math">
+                    <m:f>
+                      <m:fPr>
+                        <m:ctrlPr>
+                          <a:rPr lang="en-US" i="1">
+                            <a:latin typeface="Cambria Math"/>
+                          </a:rPr>
+                        </m:ctrlPr>
+                      </m:fPr>
+                      <m:num>
+                        <m:r>
+                          <a:rPr lang="en-US" i="1">
+                            <a:latin typeface="Cambria Math"/>
+                          </a:rPr>
+                          <m:t>𝑠</m:t>
+                        </m:r>
+                        <m:r>
+                          <a:rPr lang="en-US" i="1">
+                            <a:latin typeface="Cambria Math"/>
+                          </a:rPr>
+                          <m:t>+2</m:t>
+                        </m:r>
+                      </m:num>
+                      <m:den>
+                        <m:r>
+                          <a:rPr lang="en-US" i="1">
+                            <a:latin typeface="Cambria Math"/>
+                          </a:rPr>
+                          <m:t>𝑠</m:t>
+                        </m:r>
+                      </m:den>
+                    </m:f>
+                  </m:oMath>
+                </a14:m>
+                <a:endParaRPr lang="en-US" dirty="0"/>
+              </a:p>
+              <a:p>
+                <a:pPr marL="285750" indent="-285750" algn="ctr">
+                  <a:buFontTx/>
+                  <a:buChar char="-"/>
+                </a:pPr>
+                <a:endParaRPr lang="en-US" dirty="0" smtClean="0"/>
+              </a:p>
+              <a:p>
+                <a:pPr marL="285750" indent="-285750" algn="ctr">
                   <a:buFontTx/>
                   <a:buChar char="-"/>
                 </a:pPr>
@@ -28610,8 +28970,8 @@
             </p:nvSpPr>
             <p:spPr>
               <a:xfrm>
-                <a:off x="4482790" y="189571"/>
-                <a:ext cx="5508702" cy="2500556"/>
+                <a:off x="5486400" y="1783546"/>
+                <a:ext cx="5508702" cy="4437625"/>
               </a:xfrm>
               <a:prstGeom prst="rect">
                 <a:avLst/>
@@ -28619,7 +28979,7 @@
               <a:blipFill rotWithShape="1">
                 <a:blip r:embed="rId5"/>
                 <a:stretch>
-                  <a:fillRect l="-885"/>
+                  <a:fillRect/>
                 </a:stretch>
               </a:blipFill>
             </p:spPr>
@@ -28638,6 +28998,36 @@
           </p:sp>
         </mc:Fallback>
       </mc:AlternateContent>
+      <p:sp>
+        <p:nvSpPr>
+          <p:cNvPr id="6" name="TextBox 5"/>
+          <p:cNvSpPr txBox="1"/>
+          <p:nvPr/>
+        </p:nvSpPr>
+        <p:spPr>
+          <a:xfrm>
+            <a:off x="4638907" y="267629"/>
+            <a:ext cx="2955073" cy="369332"/>
+          </a:xfrm>
+          <a:prstGeom prst="rect">
+            <a:avLst/>
+          </a:prstGeom>
+          <a:noFill/>
+        </p:spPr>
+        <p:txBody>
+          <a:bodyPr wrap="square" rtlCol="0">
+            <a:spAutoFit/>
+          </a:bodyPr>
+          <a:lstStyle/>
+          <a:p>
+            <a:r>
+              <a:rPr lang="en-US" dirty="0" err="1" smtClean="0"/>
+              <a:t>salman</a:t>
+            </a:r>
+            <a:endParaRPr lang="en-US" dirty="0"/>
+          </a:p>
+        </p:txBody>
+      </p:sp>
     </p:spTree>
     <p:extLst>
       <p:ext uri="{BB962C8B-B14F-4D97-AF65-F5344CB8AC3E}">
@@ -28659,7 +29049,7 @@
         <p:cNvPr id="1" name="">
           <a:extLst>
             <a:ext uri="{FF2B5EF4-FFF2-40B4-BE49-F238E27FC236}">
-              <a16:creationId xmlns:a16="http://schemas.microsoft.com/office/drawing/2014/main" xmlns="" id="{56A797CB-0268-3133-8FCE-DA4565E5ED61}"/>
+              <a16:creationId xmlns="" xmlns:a16="http://schemas.microsoft.com/office/drawing/2014/main" id="{56A797CB-0268-3133-8FCE-DA4565E5ED61}"/>
             </a:ext>
           </a:extLst>
         </p:cNvPr>
@@ -28679,7 +29069,7 @@
           <p:cNvPr id="8" name="TextBox 7">
             <a:extLst>
               <a:ext uri="{FF2B5EF4-FFF2-40B4-BE49-F238E27FC236}">
-                <a16:creationId xmlns:a16="http://schemas.microsoft.com/office/drawing/2014/main" xmlns="" id="{4072D0FD-1E04-B940-627A-EA9DA05DCCCD}"/>
+                <a16:creationId xmlns="" xmlns:a16="http://schemas.microsoft.com/office/drawing/2014/main" id="{4072D0FD-1E04-B940-627A-EA9DA05DCCCD}"/>
               </a:ext>
             </a:extLst>
           </p:cNvPr>
@@ -28715,7 +29105,11 @@
           </a:lstStyle>
           <a:p>
             <a:r>
-              <a:rPr lang="en-GB" dirty="0"/>
+              <a:rPr lang="en-GB" dirty="0">
+                <a:solidFill>
+                  <a:srgbClr val="00B050"/>
+                </a:solidFill>
+              </a:rPr>
               <a:t>Answer the following questions using ChatGPT</a:t>
             </a:r>
           </a:p>
@@ -28728,7 +29122,7 @@
               <p:cNvPr id="4" name="Rectangle 1">
                 <a:extLst>
                   <a:ext uri="{FF2B5EF4-FFF2-40B4-BE49-F238E27FC236}">
-                    <a16:creationId xmlns:a16="http://schemas.microsoft.com/office/drawing/2014/main" xmlns="" id="{B94834A0-1862-CA27-570A-0EDFCE7EED1A}"/>
+                    <a16:creationId xmlns="" xmlns:a16="http://schemas.microsoft.com/office/drawing/2014/main" id="{B94834A0-1862-CA27-570A-0EDFCE7EED1A}"/>
                   </a:ext>
                 </a:extLst>
               </p:cNvPr>
@@ -29257,7 +29651,7 @@
             <a:r>
               <a:rPr lang="en-US" sz="2400" b="1" dirty="0">
                 <a:solidFill>
-                  <a:srgbClr val="0000FF"/>
+                  <a:srgbClr val="00B050"/>
                 </a:solidFill>
                 <a:latin typeface="Cambria" panose="02040503050406030204" pitchFamily="18" charset="0"/>
               </a:rPr>
@@ -29271,7 +29665,7 @@
           <p:cNvPr id="4" name="TextBox 3">
             <a:extLst>
               <a:ext uri="{FF2B5EF4-FFF2-40B4-BE49-F238E27FC236}">
-                <a16:creationId xmlns:a16="http://schemas.microsoft.com/office/drawing/2014/main" xmlns="" id="{AD9D4BE0-AA7E-DAE6-7E0D-5B85686C081C}"/>
+                <a16:creationId xmlns="" xmlns:a16="http://schemas.microsoft.com/office/drawing/2014/main" id="{AD9D4BE0-AA7E-DAE6-7E0D-5B85686C081C}"/>
               </a:ext>
             </a:extLst>
           </p:cNvPr>
@@ -29307,7 +29701,11 @@
           </a:lstStyle>
           <a:p>
             <a:r>
-              <a:rPr lang="en-GB" dirty="0"/>
+              <a:rPr lang="en-GB" dirty="0">
+                <a:solidFill>
+                  <a:srgbClr val="00B050"/>
+                </a:solidFill>
+              </a:rPr>
               <a:t>Summary</a:t>
             </a:r>
           </a:p>
@@ -29495,7 +29893,7 @@
               <p:cNvPr id="11" name="Rectangle 3">
                 <a:extLst>
                   <a:ext uri="{FF2B5EF4-FFF2-40B4-BE49-F238E27FC236}">
-                    <a16:creationId xmlns:a16="http://schemas.microsoft.com/office/drawing/2014/main" xmlns="" id="{CD85C347-A663-4C54-28B7-AD7070B58688}"/>
+                    <a16:creationId xmlns="" xmlns:a16="http://schemas.microsoft.com/office/drawing/2014/main" id="{CD85C347-A663-4C54-28B7-AD7070B58688}"/>
                   </a:ext>
                 </a:extLst>
               </p:cNvPr>
@@ -30166,7 +30564,7 @@
           <p:cNvPr id="9" name="Rectangle 8">
             <a:extLst>
               <a:ext uri="{FF2B5EF4-FFF2-40B4-BE49-F238E27FC236}">
-                <a16:creationId xmlns:a16="http://schemas.microsoft.com/office/drawing/2014/main" xmlns="" id="{28583AE8-86AF-4778-9446-0CF8E5D79152}"/>
+                <a16:creationId xmlns="" xmlns:a16="http://schemas.microsoft.com/office/drawing/2014/main" id="{28583AE8-86AF-4778-9446-0CF8E5D79152}"/>
               </a:ext>
             </a:extLst>
           </p:cNvPr>
@@ -30264,7 +30662,7 @@
           <p:cNvPr id="10" name="Oval 9">
             <a:extLst>
               <a:ext uri="{FF2B5EF4-FFF2-40B4-BE49-F238E27FC236}">
-                <a16:creationId xmlns:a16="http://schemas.microsoft.com/office/drawing/2014/main" xmlns="" id="{703E8ED8-F8A9-4BD2-B8D1-FA4B984A9663}"/>
+                <a16:creationId xmlns="" xmlns:a16="http://schemas.microsoft.com/office/drawing/2014/main" id="{703E8ED8-F8A9-4BD2-B8D1-FA4B984A9663}"/>
               </a:ext>
             </a:extLst>
           </p:cNvPr>
@@ -30311,7 +30709,7 @@
           <p:cNvPr id="11" name="Straight Arrow Connector 10">
             <a:extLst>
               <a:ext uri="{FF2B5EF4-FFF2-40B4-BE49-F238E27FC236}">
-                <a16:creationId xmlns:a16="http://schemas.microsoft.com/office/drawing/2014/main" xmlns="" id="{7F2E1D61-A326-4740-AD89-D490ED29EB4B}"/>
+                <a16:creationId xmlns="" xmlns:a16="http://schemas.microsoft.com/office/drawing/2014/main" id="{7F2E1D61-A326-4740-AD89-D490ED29EB4B}"/>
               </a:ext>
             </a:extLst>
           </p:cNvPr>
@@ -30352,7 +30750,7 @@
           <p:cNvPr id="12" name="TextBox 11">
             <a:extLst>
               <a:ext uri="{FF2B5EF4-FFF2-40B4-BE49-F238E27FC236}">
-                <a16:creationId xmlns:a16="http://schemas.microsoft.com/office/drawing/2014/main" xmlns="" id="{7C4BAD87-196C-48EB-8D30-4EF2CCA8ACC9}"/>
+                <a16:creationId xmlns="" xmlns:a16="http://schemas.microsoft.com/office/drawing/2014/main" id="{7C4BAD87-196C-48EB-8D30-4EF2CCA8ACC9}"/>
               </a:ext>
             </a:extLst>
           </p:cNvPr>
@@ -30389,7 +30787,7 @@
               <p:cNvPr id="4" name="TextBox 3">
                 <a:extLst>
                   <a:ext uri="{FF2B5EF4-FFF2-40B4-BE49-F238E27FC236}">
-                    <a16:creationId xmlns:a16="http://schemas.microsoft.com/office/drawing/2014/main" xmlns="" id="{1713017D-9CD6-E4AC-5338-08140712A5EE}"/>
+                    <a16:creationId xmlns="" xmlns:a16="http://schemas.microsoft.com/office/drawing/2014/main" id="{1713017D-9CD6-E4AC-5338-08140712A5EE}"/>
                   </a:ext>
                 </a:extLst>
               </p:cNvPr>
@@ -30648,7 +31046,7 @@
               <p:cNvPr id="13" name="TextBox 12">
                 <a:extLst>
                   <a:ext uri="{FF2B5EF4-FFF2-40B4-BE49-F238E27FC236}">
-                    <a16:creationId xmlns:a16="http://schemas.microsoft.com/office/drawing/2014/main" xmlns="" id="{CBB049C1-5D97-3196-1A5C-1CA8A696F0F2}"/>
+                    <a16:creationId xmlns="" xmlns:a16="http://schemas.microsoft.com/office/drawing/2014/main" id="{CBB049C1-5D97-3196-1A5C-1CA8A696F0F2}"/>
                   </a:ext>
                 </a:extLst>
               </p:cNvPr>
@@ -31135,7 +31533,7 @@
           <p:cNvPr id="9" name="Rectangle 8">
             <a:extLst>
               <a:ext uri="{FF2B5EF4-FFF2-40B4-BE49-F238E27FC236}">
-                <a16:creationId xmlns:a16="http://schemas.microsoft.com/office/drawing/2014/main" xmlns="" id="{A9EAB25C-564D-438B-8CDB-7282C9FB47A3}"/>
+                <a16:creationId xmlns="" xmlns:a16="http://schemas.microsoft.com/office/drawing/2014/main" id="{A9EAB25C-564D-438B-8CDB-7282C9FB47A3}"/>
               </a:ext>
             </a:extLst>
           </p:cNvPr>
@@ -31233,7 +31631,7 @@
           <p:cNvPr id="2" name="Oval 1">
             <a:extLst>
               <a:ext uri="{FF2B5EF4-FFF2-40B4-BE49-F238E27FC236}">
-                <a16:creationId xmlns:a16="http://schemas.microsoft.com/office/drawing/2014/main" xmlns="" id="{D4FEBC24-84B3-4650-95AB-78FC069CFE0B}"/>
+                <a16:creationId xmlns="" xmlns:a16="http://schemas.microsoft.com/office/drawing/2014/main" id="{D4FEBC24-84B3-4650-95AB-78FC069CFE0B}"/>
               </a:ext>
             </a:extLst>
           </p:cNvPr>
@@ -31280,7 +31678,7 @@
           <p:cNvPr id="10" name="Straight Arrow Connector 9">
             <a:extLst>
               <a:ext uri="{FF2B5EF4-FFF2-40B4-BE49-F238E27FC236}">
-                <a16:creationId xmlns:a16="http://schemas.microsoft.com/office/drawing/2014/main" xmlns="" id="{B579955C-35F3-4914-98B5-AADD38DFE03C}"/>
+                <a16:creationId xmlns="" xmlns:a16="http://schemas.microsoft.com/office/drawing/2014/main" id="{B579955C-35F3-4914-98B5-AADD38DFE03C}"/>
               </a:ext>
             </a:extLst>
           </p:cNvPr>
@@ -31319,7 +31717,7 @@
           <p:cNvPr id="11" name="TextBox 10">
             <a:extLst>
               <a:ext uri="{FF2B5EF4-FFF2-40B4-BE49-F238E27FC236}">
-                <a16:creationId xmlns:a16="http://schemas.microsoft.com/office/drawing/2014/main" xmlns="" id="{194118BE-98C7-40CD-87C3-71910502C878}"/>
+                <a16:creationId xmlns="" xmlns:a16="http://schemas.microsoft.com/office/drawing/2014/main" id="{194118BE-98C7-40CD-87C3-71910502C878}"/>
               </a:ext>
             </a:extLst>
           </p:cNvPr>
@@ -31356,7 +31754,7 @@
               <p:cNvPr id="13" name="TextBox 12">
                 <a:extLst>
                   <a:ext uri="{FF2B5EF4-FFF2-40B4-BE49-F238E27FC236}">
-                    <a16:creationId xmlns:a16="http://schemas.microsoft.com/office/drawing/2014/main" xmlns="" id="{E0779257-3945-E0F5-6D87-EB6FED9C8A23}"/>
+                    <a16:creationId xmlns="" xmlns:a16="http://schemas.microsoft.com/office/drawing/2014/main" id="{E0779257-3945-E0F5-6D87-EB6FED9C8A23}"/>
                   </a:ext>
                 </a:extLst>
               </p:cNvPr>
@@ -31613,7 +32011,7 @@
               <p:cNvPr id="14" name="TextBox 13">
                 <a:extLst>
                   <a:ext uri="{FF2B5EF4-FFF2-40B4-BE49-F238E27FC236}">
-                    <a16:creationId xmlns:a16="http://schemas.microsoft.com/office/drawing/2014/main" xmlns="" id="{B616F74A-44E3-0920-9BF6-E661DB1DF353}"/>
+                    <a16:creationId xmlns="" xmlns:a16="http://schemas.microsoft.com/office/drawing/2014/main" id="{B616F74A-44E3-0920-9BF6-E661DB1DF353}"/>
                   </a:ext>
                 </a:extLst>
               </p:cNvPr>
@@ -31916,7 +32314,7 @@
           <p:cNvPr id="4" name="Rectangle 3">
             <a:extLst>
               <a:ext uri="{FF2B5EF4-FFF2-40B4-BE49-F238E27FC236}">
-                <a16:creationId xmlns:a16="http://schemas.microsoft.com/office/drawing/2014/main" xmlns="" id="{10FBE1CC-1C19-4847-8681-C507B285FE00}"/>
+                <a16:creationId xmlns="" xmlns:a16="http://schemas.microsoft.com/office/drawing/2014/main" id="{10FBE1CC-1C19-4847-8681-C507B285FE00}"/>
               </a:ext>
             </a:extLst>
           </p:cNvPr>
@@ -31962,7 +32360,7 @@
           <p:cNvPr id="5" name="Rectangle 1">
             <a:extLst>
               <a:ext uri="{FF2B5EF4-FFF2-40B4-BE49-F238E27FC236}">
-                <a16:creationId xmlns:a16="http://schemas.microsoft.com/office/drawing/2014/main" xmlns="" id="{9D897AB3-9624-5C46-8440-16FF98783E86}"/>
+                <a16:creationId xmlns="" xmlns:a16="http://schemas.microsoft.com/office/drawing/2014/main" id="{9D897AB3-9624-5C46-8440-16FF98783E86}"/>
               </a:ext>
             </a:extLst>
           </p:cNvPr>
@@ -32419,7 +32817,7 @@
           <p:cNvPr id="12" name="TextBox 11">
             <a:extLst>
               <a:ext uri="{FF2B5EF4-FFF2-40B4-BE49-F238E27FC236}">
-                <a16:creationId xmlns:a16="http://schemas.microsoft.com/office/drawing/2014/main" xmlns="" id="{9E236E70-916E-0A46-B07C-1C3B93F54507}"/>
+                <a16:creationId xmlns="" xmlns:a16="http://schemas.microsoft.com/office/drawing/2014/main" id="{9E236E70-916E-0A46-B07C-1C3B93F54507}"/>
               </a:ext>
             </a:extLst>
           </p:cNvPr>
@@ -32458,7 +32856,7 @@
           <p:cNvPr id="9" name="Picture 8">
             <a:extLst>
               <a:ext uri="{FF2B5EF4-FFF2-40B4-BE49-F238E27FC236}">
-                <a16:creationId xmlns:a16="http://schemas.microsoft.com/office/drawing/2014/main" xmlns="" id="{28CDE912-DD40-4FE7-B3D9-833906C81B42}"/>
+                <a16:creationId xmlns="" xmlns:a16="http://schemas.microsoft.com/office/drawing/2014/main" id="{28CDE912-DD40-4FE7-B3D9-833906C81B42}"/>
               </a:ext>
             </a:extLst>
           </p:cNvPr>
@@ -32521,7 +32919,7 @@
           <p:cNvPr id="4" name="Rectangle 3">
             <a:extLst>
               <a:ext uri="{FF2B5EF4-FFF2-40B4-BE49-F238E27FC236}">
-                <a16:creationId xmlns:a16="http://schemas.microsoft.com/office/drawing/2014/main" xmlns="" id="{10FBE1CC-1C19-4847-8681-C507B285FE00}"/>
+                <a16:creationId xmlns="" xmlns:a16="http://schemas.microsoft.com/office/drawing/2014/main" id="{10FBE1CC-1C19-4847-8681-C507B285FE00}"/>
               </a:ext>
             </a:extLst>
           </p:cNvPr>
@@ -32567,7 +32965,7 @@
           <p:cNvPr id="7" name="Rectangle 1">
             <a:extLst>
               <a:ext uri="{FF2B5EF4-FFF2-40B4-BE49-F238E27FC236}">
-                <a16:creationId xmlns:a16="http://schemas.microsoft.com/office/drawing/2014/main" xmlns="" id="{A357AF2B-930B-D146-A5E8-BD5AD52532BB}"/>
+                <a16:creationId xmlns="" xmlns:a16="http://schemas.microsoft.com/office/drawing/2014/main" id="{A357AF2B-930B-D146-A5E8-BD5AD52532BB}"/>
               </a:ext>
             </a:extLst>
           </p:cNvPr>
@@ -32887,7 +33285,7 @@
           <p:cNvPr id="11" name="Picture 10">
             <a:extLst>
               <a:ext uri="{FF2B5EF4-FFF2-40B4-BE49-F238E27FC236}">
-                <a16:creationId xmlns:a16="http://schemas.microsoft.com/office/drawing/2014/main" xmlns="" id="{7B9C0334-1A2A-FC4D-82E4-946A91DC1489}"/>
+                <a16:creationId xmlns="" xmlns:a16="http://schemas.microsoft.com/office/drawing/2014/main" id="{7B9C0334-1A2A-FC4D-82E4-946A91DC1489}"/>
               </a:ext>
             </a:extLst>
           </p:cNvPr>
@@ -32923,7 +33321,7 @@
           <p:cNvPr id="13" name="TextBox 12">
             <a:extLst>
               <a:ext uri="{FF2B5EF4-FFF2-40B4-BE49-F238E27FC236}">
-                <a16:creationId xmlns:a16="http://schemas.microsoft.com/office/drawing/2014/main" xmlns="" id="{5F805DD5-7FA4-A248-9D85-6E350D0CF93C}"/>
+                <a16:creationId xmlns="" xmlns:a16="http://schemas.microsoft.com/office/drawing/2014/main" id="{5F805DD5-7FA4-A248-9D85-6E350D0CF93C}"/>
               </a:ext>
             </a:extLst>
           </p:cNvPr>
@@ -32962,7 +33360,7 @@
           <p:cNvPr id="9" name="Rectangle 8">
             <a:extLst>
               <a:ext uri="{FF2B5EF4-FFF2-40B4-BE49-F238E27FC236}">
-                <a16:creationId xmlns:a16="http://schemas.microsoft.com/office/drawing/2014/main" xmlns="" id="{E95ACEED-47D1-475B-9CCA-B12232D5B916}"/>
+                <a16:creationId xmlns="" xmlns:a16="http://schemas.microsoft.com/office/drawing/2014/main" id="{E95ACEED-47D1-475B-9CCA-B12232D5B916}"/>
               </a:ext>
             </a:extLst>
           </p:cNvPr>
@@ -33154,7 +33552,7 @@
           <p:cNvPr id="10" name="Picture 9">
             <a:extLst>
               <a:ext uri="{FF2B5EF4-FFF2-40B4-BE49-F238E27FC236}">
-                <a16:creationId xmlns:a16="http://schemas.microsoft.com/office/drawing/2014/main" xmlns="" id="{E126D1A1-353B-4E3A-97E8-42E581A1CAAE}"/>
+                <a16:creationId xmlns="" xmlns:a16="http://schemas.microsoft.com/office/drawing/2014/main" id="{E126D1A1-353B-4E3A-97E8-42E581A1CAAE}"/>
               </a:ext>
             </a:extLst>
           </p:cNvPr>
@@ -33190,7 +33588,7 @@
           <p:cNvPr id="14" name="TextBox 13">
             <a:extLst>
               <a:ext uri="{FF2B5EF4-FFF2-40B4-BE49-F238E27FC236}">
-                <a16:creationId xmlns:a16="http://schemas.microsoft.com/office/drawing/2014/main" xmlns="" id="{77B7460E-A0F1-4B0B-A918-1F899B7C6593}"/>
+                <a16:creationId xmlns="" xmlns:a16="http://schemas.microsoft.com/office/drawing/2014/main" id="{77B7460E-A0F1-4B0B-A918-1F899B7C6593}"/>
               </a:ext>
             </a:extLst>
           </p:cNvPr>
@@ -33259,7 +33657,7 @@
           <p:cNvPr id="5" name="Picture 4">
             <a:extLst>
               <a:ext uri="{FF2B5EF4-FFF2-40B4-BE49-F238E27FC236}">
-                <a16:creationId xmlns:a16="http://schemas.microsoft.com/office/drawing/2014/main" xmlns="" id="{BAF199E9-1DE5-D042-8FBB-342084D2DDAD}"/>
+                <a16:creationId xmlns="" xmlns:a16="http://schemas.microsoft.com/office/drawing/2014/main" id="{BAF199E9-1DE5-D042-8FBB-342084D2DDAD}"/>
               </a:ext>
             </a:extLst>
           </p:cNvPr>
@@ -33295,7 +33693,7 @@
           <p:cNvPr id="6" name="Picture 5">
             <a:extLst>
               <a:ext uri="{FF2B5EF4-FFF2-40B4-BE49-F238E27FC236}">
-                <a16:creationId xmlns:a16="http://schemas.microsoft.com/office/drawing/2014/main" xmlns="" id="{E6F136D8-56C8-C049-9FC7-F93AB5FFDA45}"/>
+                <a16:creationId xmlns="" xmlns:a16="http://schemas.microsoft.com/office/drawing/2014/main" id="{E6F136D8-56C8-C049-9FC7-F93AB5FFDA45}"/>
               </a:ext>
             </a:extLst>
           </p:cNvPr>
@@ -33331,7 +33729,7 @@
           <p:cNvPr id="9" name="Rectangle 1">
             <a:extLst>
               <a:ext uri="{FF2B5EF4-FFF2-40B4-BE49-F238E27FC236}">
-                <a16:creationId xmlns:a16="http://schemas.microsoft.com/office/drawing/2014/main" xmlns="" id="{266B88D3-C8D8-6D4B-B029-ACF0AC489B00}"/>
+                <a16:creationId xmlns="" xmlns:a16="http://schemas.microsoft.com/office/drawing/2014/main" id="{266B88D3-C8D8-6D4B-B029-ACF0AC489B00}"/>
               </a:ext>
             </a:extLst>
           </p:cNvPr>
@@ -33455,7 +33853,7 @@
           <p:cNvPr id="11" name="Picture 10">
             <a:extLst>
               <a:ext uri="{FF2B5EF4-FFF2-40B4-BE49-F238E27FC236}">
-                <a16:creationId xmlns:a16="http://schemas.microsoft.com/office/drawing/2014/main" xmlns="" id="{2C2CA57C-754C-422C-A6D6-ED1490056993}"/>
+                <a16:creationId xmlns="" xmlns:a16="http://schemas.microsoft.com/office/drawing/2014/main" id="{2C2CA57C-754C-422C-A6D6-ED1490056993}"/>
               </a:ext>
             </a:extLst>
           </p:cNvPr>
@@ -33488,7 +33886,7 @@
           <p:cNvPr id="12" name="Straight Arrow Connector 11">
             <a:extLst>
               <a:ext uri="{FF2B5EF4-FFF2-40B4-BE49-F238E27FC236}">
-                <a16:creationId xmlns:a16="http://schemas.microsoft.com/office/drawing/2014/main" xmlns="" id="{0E1494B9-FFCA-4665-AEB5-D1B3E0F4E470}"/>
+                <a16:creationId xmlns="" xmlns:a16="http://schemas.microsoft.com/office/drawing/2014/main" id="{0E1494B9-FFCA-4665-AEB5-D1B3E0F4E470}"/>
               </a:ext>
             </a:extLst>
           </p:cNvPr>
@@ -33532,7 +33930,7 @@
           <p:cNvPr id="13" name="Straight Arrow Connector 12">
             <a:extLst>
               <a:ext uri="{FF2B5EF4-FFF2-40B4-BE49-F238E27FC236}">
-                <a16:creationId xmlns:a16="http://schemas.microsoft.com/office/drawing/2014/main" xmlns="" id="{0998E796-D5F5-42BE-A5CD-66996B13FCD9}"/>
+                <a16:creationId xmlns="" xmlns:a16="http://schemas.microsoft.com/office/drawing/2014/main" id="{0998E796-D5F5-42BE-A5CD-66996B13FCD9}"/>
               </a:ext>
             </a:extLst>
           </p:cNvPr>
@@ -33576,7 +33974,7 @@
           <p:cNvPr id="14" name="TextBox 13">
             <a:extLst>
               <a:ext uri="{FF2B5EF4-FFF2-40B4-BE49-F238E27FC236}">
-                <a16:creationId xmlns:a16="http://schemas.microsoft.com/office/drawing/2014/main" xmlns="" id="{51D644B3-F80F-48C1-AF7E-218949C7E97D}"/>
+                <a16:creationId xmlns="" xmlns:a16="http://schemas.microsoft.com/office/drawing/2014/main" id="{51D644B3-F80F-48C1-AF7E-218949C7E97D}"/>
               </a:ext>
             </a:extLst>
           </p:cNvPr>
@@ -33611,7 +34009,7 @@
           <p:cNvPr id="16" name="TextBox 15">
             <a:extLst>
               <a:ext uri="{FF2B5EF4-FFF2-40B4-BE49-F238E27FC236}">
-                <a16:creationId xmlns:a16="http://schemas.microsoft.com/office/drawing/2014/main" xmlns="" id="{1AD2DB81-2A7B-42E6-AADE-293CA7620E56}"/>
+                <a16:creationId xmlns="" xmlns:a16="http://schemas.microsoft.com/office/drawing/2014/main" id="{1AD2DB81-2A7B-42E6-AADE-293CA7620E56}"/>
               </a:ext>
             </a:extLst>
           </p:cNvPr>
@@ -33766,7 +34164,7 @@
           <p:cNvPr id="9" name="Rectangle 8">
             <a:extLst>
               <a:ext uri="{FF2B5EF4-FFF2-40B4-BE49-F238E27FC236}">
-                <a16:creationId xmlns:a16="http://schemas.microsoft.com/office/drawing/2014/main" xmlns="" id="{9B3A9B10-5284-4BF1-80EE-DF51EA0886A1}"/>
+                <a16:creationId xmlns="" xmlns:a16="http://schemas.microsoft.com/office/drawing/2014/main" id="{9B3A9B10-5284-4BF1-80EE-DF51EA0886A1}"/>
               </a:ext>
             </a:extLst>
           </p:cNvPr>
@@ -33844,7 +34242,7 @@
           <p:cNvPr id="10" name="Oval 9">
             <a:extLst>
               <a:ext uri="{FF2B5EF4-FFF2-40B4-BE49-F238E27FC236}">
-                <a16:creationId xmlns:a16="http://schemas.microsoft.com/office/drawing/2014/main" xmlns="" id="{AE54AC22-55AA-4DAE-9544-36BE76AB2219}"/>
+                <a16:creationId xmlns="" xmlns:a16="http://schemas.microsoft.com/office/drawing/2014/main" id="{AE54AC22-55AA-4DAE-9544-36BE76AB2219}"/>
               </a:ext>
             </a:extLst>
           </p:cNvPr>
@@ -33891,7 +34289,7 @@
           <p:cNvPr id="11" name="Straight Arrow Connector 10">
             <a:extLst>
               <a:ext uri="{FF2B5EF4-FFF2-40B4-BE49-F238E27FC236}">
-                <a16:creationId xmlns:a16="http://schemas.microsoft.com/office/drawing/2014/main" xmlns="" id="{C472FF88-129B-452A-B82B-55B7E404D4E7}"/>
+                <a16:creationId xmlns="" xmlns:a16="http://schemas.microsoft.com/office/drawing/2014/main" id="{C472FF88-129B-452A-B82B-55B7E404D4E7}"/>
               </a:ext>
             </a:extLst>
           </p:cNvPr>
@@ -33932,7 +34330,7 @@
           <p:cNvPr id="12" name="TextBox 11">
             <a:extLst>
               <a:ext uri="{FF2B5EF4-FFF2-40B4-BE49-F238E27FC236}">
-                <a16:creationId xmlns:a16="http://schemas.microsoft.com/office/drawing/2014/main" xmlns="" id="{7966C684-B70F-4ABC-B3D5-67365B0EA2B8}"/>
+                <a16:creationId xmlns="" xmlns:a16="http://schemas.microsoft.com/office/drawing/2014/main" id="{7966C684-B70F-4ABC-B3D5-67365B0EA2B8}"/>
               </a:ext>
             </a:extLst>
           </p:cNvPr>
@@ -33969,7 +34367,7 @@
               <p:cNvPr id="13" name="TextBox 12">
                 <a:extLst>
                   <a:ext uri="{FF2B5EF4-FFF2-40B4-BE49-F238E27FC236}">
-                    <a16:creationId xmlns:a16="http://schemas.microsoft.com/office/drawing/2014/main" xmlns="" id="{C96C3B3E-8472-F67A-FFCE-3055B5645B01}"/>
+                    <a16:creationId xmlns="" xmlns:a16="http://schemas.microsoft.com/office/drawing/2014/main" id="{C96C3B3E-8472-F67A-FFCE-3055B5645B01}"/>
                   </a:ext>
                 </a:extLst>
               </p:cNvPr>
@@ -34229,7 +34627,7 @@
               <p:cNvPr id="14" name="TextBox 13">
                 <a:extLst>
                   <a:ext uri="{FF2B5EF4-FFF2-40B4-BE49-F238E27FC236}">
-                    <a16:creationId xmlns:a16="http://schemas.microsoft.com/office/drawing/2014/main" xmlns="" id="{2B281EDE-CDC9-671D-8CD2-C896AA3E5ED3}"/>
+                    <a16:creationId xmlns="" xmlns:a16="http://schemas.microsoft.com/office/drawing/2014/main" id="{2B281EDE-CDC9-671D-8CD2-C896AA3E5ED3}"/>
                   </a:ext>
                 </a:extLst>
               </p:cNvPr>
@@ -35141,7 +35539,7 @@
   <a:extraClrSchemeLst/>
   <a:extLst>
     <a:ext uri="{05A4C25C-085E-4340-85A3-A5531E510DB2}">
-      <thm15:themeFamily xmlns:thm15="http://schemas.microsoft.com/office/thememl/2012/main" xmlns="" name="Office Theme" id="{62F939B6-93AF-4DB8-9C6B-D6C7DFDC589F}" vid="{4A3C46E8-61CC-4603-A589-7422A47A8E4A}"/>
+      <thm15:themeFamily xmlns="" xmlns:thm15="http://schemas.microsoft.com/office/thememl/2012/main" name="Office Theme" id="{62F939B6-93AF-4DB8-9C6B-D6C7DFDC589F}" vid="{4A3C46E8-61CC-4603-A589-7422A47A8E4A}"/>
     </a:ext>
   </a:extLst>
 </a:theme>

</xml_diff>